<commit_message>
adding updated slides from 3/24
</commit_message>
<xml_diff>
--- a/2nd Segment Project Deliverable/Deliverable2_Storyboard.pptx
+++ b/2nd Segment Project Deliverable/Deliverable2_Storyboard.pptx
@@ -9,11 +9,14 @@
     <p:sldId id="257" r:id="rId3"/>
     <p:sldId id="258" r:id="rId4"/>
     <p:sldId id="259" r:id="rId5"/>
-    <p:sldId id="260" r:id="rId6"/>
-    <p:sldId id="261" r:id="rId7"/>
-    <p:sldId id="262" r:id="rId8"/>
-    <p:sldId id="263" r:id="rId9"/>
-    <p:sldId id="264" r:id="rId10"/>
+    <p:sldId id="269" r:id="rId6"/>
+    <p:sldId id="260" r:id="rId7"/>
+    <p:sldId id="265" r:id="rId8"/>
+    <p:sldId id="266" r:id="rId9"/>
+    <p:sldId id="261" r:id="rId10"/>
+    <p:sldId id="262" r:id="rId11"/>
+    <p:sldId id="263" r:id="rId12"/>
+    <p:sldId id="268" r:id="rId13"/>
   </p:sldIdLst>
   <p:sldSz cx="12192000" cy="6858000"/>
   <p:notesSz cx="6858000" cy="9144000"/>
@@ -112,6 +115,11 @@
       </a:defRPr>
     </a:lvl9pPr>
   </p:defaultTextStyle>
+  <p:extLst>
+    <p:ext uri="{EFAFB233-063F-42B5-8137-9DF3F51BA10A}">
+      <p15:sldGuideLst xmlns:p15="http://schemas.microsoft.com/office/powerpoint/2012/main"/>
+    </p:ext>
+  </p:extLst>
 </p:presentation>
 </file>
 
@@ -332,7 +340,7 @@
           <a:p>
             <a:fld id="{9AB3A824-1A51-4B26-AD58-A6D8E14F6C04}" type="datetimeFigureOut">
               <a:rPr lang="en-US" dirty="0"/>
-              <a:t>3/22/22</a:t>
+              <a:t>3/24/22</a:t>
             </a:fld>
             <a:endParaRPr lang="en-US" dirty="0"/>
           </a:p>
@@ -666,7 +674,7 @@
           <a:p>
             <a:fld id="{D857E33E-8B18-4087-B112-809917729534}" type="datetimeFigureOut">
               <a:rPr lang="en-US" dirty="0"/>
-              <a:t>3/22/22</a:t>
+              <a:t>3/24/22</a:t>
             </a:fld>
             <a:endParaRPr lang="en-US" dirty="0"/>
           </a:p>
@@ -968,7 +976,7 @@
           <a:p>
             <a:fld id="{D3FFE419-2371-464F-8239-3959401C3561}" type="datetimeFigureOut">
               <a:rPr lang="en-US" dirty="0"/>
-              <a:t>3/22/22</a:t>
+              <a:t>3/24/22</a:t>
             </a:fld>
             <a:endParaRPr lang="en-US" dirty="0"/>
           </a:p>
@@ -1215,7 +1223,7 @@
           <a:p>
             <a:fld id="{97D162C4-EDD9-4389-A98B-B87ECEA2A816}" type="datetimeFigureOut">
               <a:rPr lang="en-US" dirty="0"/>
-              <a:t>3/22/22</a:t>
+              <a:t>3/24/22</a:t>
             </a:fld>
             <a:endParaRPr lang="en-US" dirty="0"/>
           </a:p>
@@ -1622,7 +1630,7 @@
           <a:p>
             <a:fld id="{3E5059C3-6A89-4494-99FF-5A4D6FFD50EB}" type="datetimeFigureOut">
               <a:rPr lang="en-US" dirty="0"/>
-              <a:t>3/22/22</a:t>
+              <a:t>3/24/22</a:t>
             </a:fld>
             <a:endParaRPr lang="en-US" dirty="0"/>
           </a:p>
@@ -1936,7 +1944,7 @@
           <a:p>
             <a:fld id="{CA954B2F-12DE-47F5-8894-472B206D2E1E}" type="datetimeFigureOut">
               <a:rPr lang="en-US" dirty="0"/>
-              <a:t>3/22/22</a:t>
+              <a:t>3/24/22</a:t>
             </a:fld>
             <a:endParaRPr lang="en-US" dirty="0"/>
           </a:p>
@@ -2480,7 +2488,7 @@
           <a:p>
             <a:fld id="{3F30E46F-7819-4ACF-B48B-48222C2ACC88}" type="datetimeFigureOut">
               <a:rPr lang="en-US" dirty="0"/>
-              <a:t>3/22/22</a:t>
+              <a:t>3/24/22</a:t>
             </a:fld>
             <a:endParaRPr lang="en-US" dirty="0"/>
           </a:p>
@@ -2675,7 +2683,7 @@
           <a:p>
             <a:fld id="{1FAF3416-4057-4DAA-829D-4CA07428D088}" type="datetimeFigureOut">
               <a:rPr lang="en-US" dirty="0"/>
-              <a:t>3/22/22</a:t>
+              <a:t>3/24/22</a:t>
             </a:fld>
             <a:endParaRPr lang="en-US" dirty="0"/>
           </a:p>
@@ -2888,7 +2896,7 @@
           <a:p>
             <a:fld id="{921D9284-D300-4297-87F7-E791DCC15DB1}" type="datetimeFigureOut">
               <a:rPr lang="en-US" dirty="0"/>
-              <a:t>3/22/22</a:t>
+              <a:t>3/24/22</a:t>
             </a:fld>
             <a:endParaRPr lang="en-US" dirty="0"/>
           </a:p>
@@ -3257,7 +3265,7 @@
           <a:p>
             <a:fld id="{37D525BB-DA17-4BA0-B3C8-3AC3ABC827E6}" type="datetimeFigureOut">
               <a:rPr lang="en-US" dirty="0"/>
-              <a:t>3/22/22</a:t>
+              <a:t>3/24/22</a:t>
             </a:fld>
             <a:endParaRPr lang="en-US" dirty="0"/>
           </a:p>
@@ -3660,7 +3668,7 @@
           <a:p>
             <a:fld id="{B16C4C9A-3960-41CF-A4E9-2A8FB932454B}" type="datetimeFigureOut">
               <a:rPr lang="en-US" dirty="0"/>
-              <a:t>3/22/22</a:t>
+              <a:t>3/24/22</a:t>
             </a:fld>
             <a:endParaRPr lang="en-US" dirty="0"/>
           </a:p>
@@ -3971,7 +3979,7 @@
           <a:p>
             <a:fld id="{3CBC1C18-307B-4F68-A007-B5B542270E8D}" type="datetimeFigureOut">
               <a:rPr lang="en-US" dirty="0"/>
-              <a:t>3/22/22</a:t>
+              <a:t>3/24/22</a:t>
             </a:fld>
             <a:endParaRPr lang="en-US" dirty="0"/>
           </a:p>
@@ -4536,6 +4544,460 @@
 </p:sld>
 </file>
 
+<file path=ppt/slides/slide10.xml><?xml version="1.0" encoding="utf-8"?>
+<p:sld xmlns:a="http://schemas.openxmlformats.org/drawingml/2006/main" xmlns:r="http://schemas.openxmlformats.org/officeDocument/2006/relationships" xmlns:p="http://schemas.openxmlformats.org/presentationml/2006/main">
+  <p:cSld>
+    <p:spTree>
+      <p:nvGrpSpPr>
+        <p:cNvPr id="1" name=""/>
+        <p:cNvGrpSpPr/>
+        <p:nvPr/>
+      </p:nvGrpSpPr>
+      <p:grpSpPr>
+        <a:xfrm>
+          <a:off x="0" y="0"/>
+          <a:ext cx="0" cy="0"/>
+          <a:chOff x="0" y="0"/>
+          <a:chExt cx="0" cy="0"/>
+        </a:xfrm>
+      </p:grpSpPr>
+      <p:sp>
+        <p:nvSpPr>
+          <p:cNvPr id="4" name="Title 3">
+            <a:extLst>
+              <a:ext uri="{FF2B5EF4-FFF2-40B4-BE49-F238E27FC236}">
+                <a16:creationId xmlns:a16="http://schemas.microsoft.com/office/drawing/2014/main" id="{5DD0D9A4-96F1-FC40-84B0-47FC29E56137}"/>
+              </a:ext>
+            </a:extLst>
+          </p:cNvPr>
+          <p:cNvSpPr>
+            <a:spLocks noGrp="1"/>
+          </p:cNvSpPr>
+          <p:nvPr>
+            <p:ph type="title"/>
+          </p:nvPr>
+        </p:nvSpPr>
+        <p:spPr>
+          <a:xfrm>
+            <a:off x="1970323" y="99603"/>
+            <a:ext cx="7702183" cy="1903241"/>
+          </a:xfrm>
+        </p:spPr>
+        <p:txBody>
+          <a:bodyPr/>
+          <a:lstStyle/>
+          <a:p>
+            <a:r>
+              <a:rPr lang="en-US" dirty="0"/>
+              <a:t>Storyboard:</a:t>
+            </a:r>
+            <a:br>
+              <a:rPr lang="en-US" dirty="0"/>
+            </a:br>
+            <a:r>
+              <a:rPr lang="en-US" dirty="0"/>
+              <a:t>Prefer Skills amount market and different companies</a:t>
+            </a:r>
+            <a:endParaRPr lang="en-US" dirty="0">
+              <a:highlight>
+                <a:srgbClr val="0000FF"/>
+              </a:highlight>
+            </a:endParaRPr>
+          </a:p>
+        </p:txBody>
+      </p:sp>
+      <p:sp>
+        <p:nvSpPr>
+          <p:cNvPr id="6" name="Text Placeholder 5">
+            <a:extLst>
+              <a:ext uri="{FF2B5EF4-FFF2-40B4-BE49-F238E27FC236}">
+                <a16:creationId xmlns:a16="http://schemas.microsoft.com/office/drawing/2014/main" id="{92D7F5F9-1D37-B641-AC5C-AF995E223840}"/>
+              </a:ext>
+            </a:extLst>
+          </p:cNvPr>
+          <p:cNvSpPr>
+            <a:spLocks noGrp="1"/>
+          </p:cNvSpPr>
+          <p:nvPr>
+            <p:ph type="body" sz="half" idx="2"/>
+          </p:nvPr>
+        </p:nvSpPr>
+        <p:spPr>
+          <a:xfrm>
+            <a:off x="2045822" y="2154308"/>
+            <a:ext cx="2664361" cy="2386397"/>
+          </a:xfrm>
+        </p:spPr>
+        <p:txBody>
+          <a:bodyPr/>
+          <a:lstStyle/>
+          <a:p>
+            <a:r>
+              <a:rPr lang="en-US" dirty="0">
+                <a:highlight>
+                  <a:srgbClr val="0000FF"/>
+                </a:highlight>
+              </a:rPr>
+              <a:t>User can filter the titles and companies to see what skills are required or highly acquire by the current employees. </a:t>
+            </a:r>
+          </a:p>
+        </p:txBody>
+      </p:sp>
+      <p:pic>
+        <p:nvPicPr>
+          <p:cNvPr id="8" name="Picture 7">
+            <a:extLst>
+              <a:ext uri="{FF2B5EF4-FFF2-40B4-BE49-F238E27FC236}">
+                <a16:creationId xmlns:a16="http://schemas.microsoft.com/office/drawing/2014/main" id="{D88EAA47-0B0E-4DED-B56B-12DED60FF4F5}"/>
+              </a:ext>
+            </a:extLst>
+          </p:cNvPr>
+          <p:cNvPicPr>
+            <a:picLocks noChangeAspect="1"/>
+          </p:cNvPicPr>
+          <p:nvPr/>
+        </p:nvPicPr>
+        <p:blipFill>
+          <a:blip r:embed="rId2"/>
+          <a:stretch>
+            <a:fillRect/>
+          </a:stretch>
+        </p:blipFill>
+        <p:spPr>
+          <a:xfrm>
+            <a:off x="4857225" y="2198514"/>
+            <a:ext cx="5958584" cy="3044481"/>
+          </a:xfrm>
+          <a:prstGeom prst="rect">
+            <a:avLst/>
+          </a:prstGeom>
+        </p:spPr>
+      </p:pic>
+      <p:sp>
+        <p:nvSpPr>
+          <p:cNvPr id="9" name="TextBox 8">
+            <a:extLst>
+              <a:ext uri="{FF2B5EF4-FFF2-40B4-BE49-F238E27FC236}">
+                <a16:creationId xmlns:a16="http://schemas.microsoft.com/office/drawing/2014/main" id="{6FBB9BE9-36B3-46D7-A025-BBC59681BE27}"/>
+              </a:ext>
+            </a:extLst>
+          </p:cNvPr>
+          <p:cNvSpPr txBox="1"/>
+          <p:nvPr/>
+        </p:nvSpPr>
+        <p:spPr>
+          <a:xfrm>
+            <a:off x="3926047" y="5307860"/>
+            <a:ext cx="7820939" cy="261610"/>
+          </a:xfrm>
+          <a:prstGeom prst="rect">
+            <a:avLst/>
+          </a:prstGeom>
+          <a:noFill/>
+        </p:spPr>
+        <p:txBody>
+          <a:bodyPr wrap="square" rtlCol="0">
+            <a:spAutoFit/>
+          </a:bodyPr>
+          <a:lstStyle/>
+          <a:p>
+            <a:pPr algn="ctr"/>
+            <a:r>
+              <a:rPr lang="en-US" sz="1100" dirty="0"/>
+              <a:t>https://public.tableau.com/app/profile/sirius.liao/viz/Preferskillsfordatascientist/Story1</a:t>
+            </a:r>
+          </a:p>
+        </p:txBody>
+      </p:sp>
+    </p:spTree>
+    <p:extLst>
+      <p:ext uri="{BB962C8B-B14F-4D97-AF65-F5344CB8AC3E}">
+        <p14:creationId xmlns:p14="http://schemas.microsoft.com/office/powerpoint/2010/main" val="3510942167"/>
+      </p:ext>
+    </p:extLst>
+  </p:cSld>
+  <p:clrMapOvr>
+    <a:masterClrMapping/>
+  </p:clrMapOvr>
+</p:sld>
+</file>
+
+<file path=ppt/slides/slide11.xml><?xml version="1.0" encoding="utf-8"?>
+<p:sld xmlns:a="http://schemas.openxmlformats.org/drawingml/2006/main" xmlns:r="http://schemas.openxmlformats.org/officeDocument/2006/relationships" xmlns:p="http://schemas.openxmlformats.org/presentationml/2006/main">
+  <p:cSld>
+    <p:spTree>
+      <p:nvGrpSpPr>
+        <p:cNvPr id="1" name=""/>
+        <p:cNvGrpSpPr/>
+        <p:nvPr/>
+      </p:nvGrpSpPr>
+      <p:grpSpPr>
+        <a:xfrm>
+          <a:off x="0" y="0"/>
+          <a:ext cx="0" cy="0"/>
+          <a:chOff x="0" y="0"/>
+          <a:chExt cx="0" cy="0"/>
+        </a:xfrm>
+      </p:grpSpPr>
+      <p:sp>
+        <p:nvSpPr>
+          <p:cNvPr id="4" name="Title 3">
+            <a:extLst>
+              <a:ext uri="{FF2B5EF4-FFF2-40B4-BE49-F238E27FC236}">
+                <a16:creationId xmlns:a16="http://schemas.microsoft.com/office/drawing/2014/main" id="{5DD0D9A4-96F1-FC40-84B0-47FC29E56137}"/>
+              </a:ext>
+            </a:extLst>
+          </p:cNvPr>
+          <p:cNvSpPr>
+            <a:spLocks noGrp="1"/>
+          </p:cNvSpPr>
+          <p:nvPr>
+            <p:ph type="title"/>
+          </p:nvPr>
+        </p:nvSpPr>
+        <p:spPr>
+          <a:xfrm>
+            <a:off x="1970323" y="1282451"/>
+            <a:ext cx="6771005" cy="1903241"/>
+          </a:xfrm>
+        </p:spPr>
+        <p:txBody>
+          <a:bodyPr/>
+          <a:lstStyle/>
+          <a:p>
+            <a:r>
+              <a:rPr lang="en-US" dirty="0"/>
+              <a:t>Storyboard: </a:t>
+            </a:r>
+            <a:br>
+              <a:rPr lang="en-US" dirty="0"/>
+            </a:br>
+            <a:r>
+              <a:rPr lang="en-US" dirty="0">
+                <a:highlight>
+                  <a:srgbClr val="0000FF"/>
+                </a:highlight>
+              </a:rPr>
+              <a:t>External factors that affect the average salary</a:t>
+            </a:r>
+          </a:p>
+        </p:txBody>
+      </p:sp>
+      <p:sp>
+        <p:nvSpPr>
+          <p:cNvPr id="5" name="Content Placeholder 4">
+            <a:extLst>
+              <a:ext uri="{FF2B5EF4-FFF2-40B4-BE49-F238E27FC236}">
+                <a16:creationId xmlns:a16="http://schemas.microsoft.com/office/drawing/2014/main" id="{2E3FA64B-9622-5A45-B84B-B1EE025856C4}"/>
+              </a:ext>
+            </a:extLst>
+          </p:cNvPr>
+          <p:cNvSpPr>
+            <a:spLocks noGrp="1"/>
+          </p:cNvSpPr>
+          <p:nvPr>
+            <p:ph idx="1"/>
+          </p:nvPr>
+        </p:nvSpPr>
+        <p:spPr/>
+        <p:txBody>
+          <a:bodyPr/>
+          <a:lstStyle/>
+          <a:p>
+            <a:r>
+              <a:rPr lang="en-US" dirty="0">
+                <a:highlight>
+                  <a:srgbClr val="0000FF"/>
+                </a:highlight>
+              </a:rPr>
+              <a:t>Image here</a:t>
+            </a:r>
+          </a:p>
+        </p:txBody>
+      </p:sp>
+      <p:sp>
+        <p:nvSpPr>
+          <p:cNvPr id="6" name="Text Placeholder 5">
+            <a:extLst>
+              <a:ext uri="{FF2B5EF4-FFF2-40B4-BE49-F238E27FC236}">
+                <a16:creationId xmlns:a16="http://schemas.microsoft.com/office/drawing/2014/main" id="{92D7F5F9-1D37-B641-AC5C-AF995E223840}"/>
+              </a:ext>
+            </a:extLst>
+          </p:cNvPr>
+          <p:cNvSpPr>
+            <a:spLocks noGrp="1"/>
+          </p:cNvSpPr>
+          <p:nvPr>
+            <p:ph type="body" sz="half" idx="2"/>
+          </p:nvPr>
+        </p:nvSpPr>
+        <p:spPr/>
+        <p:txBody>
+          <a:bodyPr/>
+          <a:lstStyle/>
+          <a:p>
+            <a:r>
+              <a:rPr lang="en-US" dirty="0">
+                <a:highlight>
+                  <a:srgbClr val="0000FF"/>
+                </a:highlight>
+              </a:rPr>
+              <a:t>Description of visual and any interactive features</a:t>
+            </a:r>
+          </a:p>
+        </p:txBody>
+      </p:sp>
+    </p:spTree>
+    <p:extLst>
+      <p:ext uri="{BB962C8B-B14F-4D97-AF65-F5344CB8AC3E}">
+        <p14:creationId xmlns:p14="http://schemas.microsoft.com/office/powerpoint/2010/main" val="2104079767"/>
+      </p:ext>
+    </p:extLst>
+  </p:cSld>
+  <p:clrMapOvr>
+    <a:masterClrMapping/>
+  </p:clrMapOvr>
+</p:sld>
+</file>
+
+<file path=ppt/slides/slide12.xml><?xml version="1.0" encoding="utf-8"?>
+<p:sld xmlns:a="http://schemas.openxmlformats.org/drawingml/2006/main" xmlns:r="http://schemas.openxmlformats.org/officeDocument/2006/relationships" xmlns:p="http://schemas.openxmlformats.org/presentationml/2006/main">
+  <p:cSld>
+    <p:spTree>
+      <p:nvGrpSpPr>
+        <p:cNvPr id="1" name=""/>
+        <p:cNvGrpSpPr/>
+        <p:nvPr/>
+      </p:nvGrpSpPr>
+      <p:grpSpPr>
+        <a:xfrm>
+          <a:off x="0" y="0"/>
+          <a:ext cx="0" cy="0"/>
+          <a:chOff x="0" y="0"/>
+          <a:chExt cx="0" cy="0"/>
+        </a:xfrm>
+      </p:grpSpPr>
+      <p:sp>
+        <p:nvSpPr>
+          <p:cNvPr id="4" name="Title 3">
+            <a:extLst>
+              <a:ext uri="{FF2B5EF4-FFF2-40B4-BE49-F238E27FC236}">
+                <a16:creationId xmlns:a16="http://schemas.microsoft.com/office/drawing/2014/main" id="{5DD0D9A4-96F1-FC40-84B0-47FC29E56137}"/>
+              </a:ext>
+            </a:extLst>
+          </p:cNvPr>
+          <p:cNvSpPr>
+            <a:spLocks noGrp="1"/>
+          </p:cNvSpPr>
+          <p:nvPr>
+            <p:ph type="title"/>
+          </p:nvPr>
+        </p:nvSpPr>
+        <p:spPr>
+          <a:xfrm>
+            <a:off x="1970323" y="1282451"/>
+            <a:ext cx="6771005" cy="1903241"/>
+          </a:xfrm>
+        </p:spPr>
+        <p:txBody>
+          <a:bodyPr/>
+          <a:lstStyle/>
+          <a:p>
+            <a:r>
+              <a:rPr lang="en-US" dirty="0"/>
+              <a:t>Storyboard: </a:t>
+            </a:r>
+            <a:br>
+              <a:rPr lang="en-US" dirty="0"/>
+            </a:br>
+            <a:r>
+              <a:rPr lang="en-US" dirty="0">
+                <a:highlight>
+                  <a:srgbClr val="0000FF"/>
+                </a:highlight>
+              </a:rPr>
+              <a:t>Internal factors that affect the average salary</a:t>
+            </a:r>
+          </a:p>
+        </p:txBody>
+      </p:sp>
+      <p:sp>
+        <p:nvSpPr>
+          <p:cNvPr id="5" name="Content Placeholder 4">
+            <a:extLst>
+              <a:ext uri="{FF2B5EF4-FFF2-40B4-BE49-F238E27FC236}">
+                <a16:creationId xmlns:a16="http://schemas.microsoft.com/office/drawing/2014/main" id="{2E3FA64B-9622-5A45-B84B-B1EE025856C4}"/>
+              </a:ext>
+            </a:extLst>
+          </p:cNvPr>
+          <p:cNvSpPr>
+            <a:spLocks noGrp="1"/>
+          </p:cNvSpPr>
+          <p:nvPr>
+            <p:ph idx="1"/>
+          </p:nvPr>
+        </p:nvSpPr>
+        <p:spPr/>
+        <p:txBody>
+          <a:bodyPr/>
+          <a:lstStyle/>
+          <a:p>
+            <a:r>
+              <a:rPr lang="en-US" dirty="0">
+                <a:highlight>
+                  <a:srgbClr val="0000FF"/>
+                </a:highlight>
+              </a:rPr>
+              <a:t>Image here</a:t>
+            </a:r>
+          </a:p>
+        </p:txBody>
+      </p:sp>
+      <p:sp>
+        <p:nvSpPr>
+          <p:cNvPr id="6" name="Text Placeholder 5">
+            <a:extLst>
+              <a:ext uri="{FF2B5EF4-FFF2-40B4-BE49-F238E27FC236}">
+                <a16:creationId xmlns:a16="http://schemas.microsoft.com/office/drawing/2014/main" id="{92D7F5F9-1D37-B641-AC5C-AF995E223840}"/>
+              </a:ext>
+            </a:extLst>
+          </p:cNvPr>
+          <p:cNvSpPr>
+            <a:spLocks noGrp="1"/>
+          </p:cNvSpPr>
+          <p:nvPr>
+            <p:ph type="body" sz="half" idx="2"/>
+          </p:nvPr>
+        </p:nvSpPr>
+        <p:spPr/>
+        <p:txBody>
+          <a:bodyPr/>
+          <a:lstStyle/>
+          <a:p>
+            <a:r>
+              <a:rPr lang="en-US" dirty="0">
+                <a:highlight>
+                  <a:srgbClr val="0000FF"/>
+                </a:highlight>
+              </a:rPr>
+              <a:t>Description of visual and any interactive features</a:t>
+            </a:r>
+          </a:p>
+        </p:txBody>
+      </p:sp>
+    </p:spTree>
+    <p:extLst>
+      <p:ext uri="{BB962C8B-B14F-4D97-AF65-F5344CB8AC3E}">
+        <p14:creationId xmlns:p14="http://schemas.microsoft.com/office/powerpoint/2010/main" val="251215521"/>
+      </p:ext>
+    </p:extLst>
+  </p:cSld>
+  <p:clrMapOvr>
+    <a:masterClrMapping/>
+  </p:clrMapOvr>
+</p:sld>
+</file>
+
 <file path=ppt/slides/slide2.xml><?xml version="1.0" encoding="utf-8"?>
 <p:sld xmlns:a="http://schemas.openxmlformats.org/drawingml/2006/main" xmlns:r="http://schemas.openxmlformats.org/officeDocument/2006/relationships" xmlns:p="http://schemas.openxmlformats.org/presentationml/2006/main">
   <p:cSld>
@@ -4605,7 +5067,7 @@
           <a:p>
             <a:r>
               <a:rPr lang="en-US" dirty="0"/>
-              <a:t>We selected this topic because it was one that was of interest to all of us. As we graduate from this course and enter the job market we have a frame of reference when negotiating offers.</a:t>
+              <a:t>We selected this topic because it was one that was of interest to all of us including our classmates. As we graduate from this course and enter the job market we have a frame of reference when negotiating offers.</a:t>
             </a:r>
           </a:p>
           <a:p>
@@ -4671,7 +5133,12 @@
             <p:ph type="title"/>
           </p:nvPr>
         </p:nvSpPr>
-        <p:spPr/>
+        <p:spPr>
+          <a:xfrm>
+            <a:off x="2439302" y="352857"/>
+            <a:ext cx="7958331" cy="1077229"/>
+          </a:xfrm>
+        </p:spPr>
         <p:txBody>
           <a:bodyPr/>
           <a:lstStyle/>
@@ -4700,10 +5167,15 @@
             <p:ph idx="1"/>
           </p:nvPr>
         </p:nvSpPr>
-        <p:spPr/>
+        <p:spPr>
+          <a:xfrm>
+            <a:off x="2439302" y="1430086"/>
+            <a:ext cx="7796540" cy="4911720"/>
+          </a:xfrm>
+        </p:spPr>
         <p:txBody>
           <a:bodyPr>
-            <a:normAutofit fontScale="92500" lnSpcReduction="10000"/>
+            <a:normAutofit fontScale="70000" lnSpcReduction="20000"/>
           </a:bodyPr>
           <a:lstStyle/>
           <a:p>
@@ -4739,6 +5211,56 @@
               <a:rPr lang="en-US" dirty="0"/>
               <a:t>During our analysis, we hoped this dataset would help us answer the question of how do different factors such as location, years of experience, gender, and company affect the anticipated salary?</a:t>
             </a:r>
+          </a:p>
+          <a:p>
+            <a:r>
+              <a:rPr lang="en-US" b="1" dirty="0"/>
+              <a:t>Limitations to Dataset</a:t>
+            </a:r>
+          </a:p>
+          <a:p>
+            <a:pPr lvl="1"/>
+            <a:r>
+              <a:rPr lang="en-US" dirty="0"/>
+              <a:t>Accuracy of the data because it was self-reported by humans</a:t>
+            </a:r>
+          </a:p>
+          <a:p>
+            <a:pPr lvl="1"/>
+            <a:r>
+              <a:rPr lang="en-US" dirty="0"/>
+              <a:t>Data did not include job descriptions, and all jobs were the same title</a:t>
+            </a:r>
+          </a:p>
+          <a:p>
+            <a:pPr lvl="1"/>
+            <a:r>
+              <a:rPr lang="en-US" dirty="0"/>
+              <a:t>There were several imbalances in the dataset such as company size, location, years of experience</a:t>
+            </a:r>
+          </a:p>
+          <a:p>
+            <a:pPr lvl="1"/>
+            <a:r>
+              <a:rPr lang="en-US" dirty="0"/>
+              <a:t>Total Yearly Compensation means different things to different people when self reporting (are stock options included, benefit packages, </a:t>
+            </a:r>
+            <a:r>
+              <a:rPr lang="en-US" dirty="0" err="1"/>
+              <a:t>etc</a:t>
+            </a:r>
+            <a:r>
+              <a:rPr lang="en-US" dirty="0"/>
+              <a:t>)</a:t>
+            </a:r>
+          </a:p>
+          <a:p>
+            <a:pPr lvl="1"/>
+            <a:endParaRPr lang="en-US" dirty="0"/>
+          </a:p>
+          <a:p>
+            <a:pPr lvl="1"/>
+            <a:endParaRPr lang="en-US" dirty="0"/>
           </a:p>
         </p:txBody>
       </p:sp>
@@ -4819,7 +5341,9 @@
         </p:nvSpPr>
         <p:spPr/>
         <p:txBody>
-          <a:bodyPr/>
+          <a:bodyPr>
+            <a:normAutofit lnSpcReduction="10000"/>
+          </a:bodyPr>
           <a:lstStyle/>
           <a:p>
             <a:r>
@@ -4838,101 +5362,78 @@
           <a:p>
             <a:pPr lvl="1"/>
             <a:r>
-              <a:rPr lang="en-US" sz="1400" dirty="0">
-                <a:highlight>
-                  <a:srgbClr val="0000FF"/>
-                </a:highlight>
-              </a:rPr>
-              <a:t>List of a few things we did to clean data (delete columns, encode, </a:t>
-            </a:r>
-            <a:r>
-              <a:rPr lang="en-US" sz="1400" dirty="0" err="1">
-                <a:highlight>
-                  <a:srgbClr val="0000FF"/>
-                </a:highlight>
-              </a:rPr>
-              <a:t>etc</a:t>
-            </a:r>
-            <a:r>
-              <a:rPr lang="en-US" sz="1400" dirty="0">
-                <a:highlight>
-                  <a:srgbClr val="FFFF00"/>
-                </a:highlight>
-              </a:rPr>
-              <a:t>)</a:t>
+              <a:rPr lang="en-US" sz="1400" dirty="0"/>
+              <a:t>Dropping unnecessary columns in Data Frame, such as</a:t>
             </a:r>
           </a:p>
           <a:p>
             <a:pPr lvl="1"/>
             <a:r>
-              <a:rPr lang="en-US" sz="1400" dirty="0">
-                <a:highlight>
-                  <a:srgbClr val="0000FF"/>
-                </a:highlight>
-              </a:rPr>
-              <a:t>X</a:t>
+              <a:rPr lang="en-US" sz="1400" dirty="0"/>
+              <a:t>Split the location into States, Cities and Countries</a:t>
             </a:r>
           </a:p>
           <a:p>
             <a:pPr lvl="1"/>
             <a:r>
-              <a:rPr lang="en-US" sz="1400" dirty="0">
-                <a:highlight>
-                  <a:srgbClr val="0000FF"/>
-                </a:highlight>
-              </a:rPr>
-              <a:t>X</a:t>
-            </a:r>
-          </a:p>
-          <a:p>
-            <a:r>
-              <a:rPr lang="en-US" dirty="0">
-                <a:highlight>
-                  <a:srgbClr val="0000FF"/>
-                </a:highlight>
-              </a:rPr>
+              <a:rPr lang="en-US" sz="1400" dirty="0"/>
+              <a:t>Use Drop Na function to remove the empty columns</a:t>
+            </a:r>
+          </a:p>
+          <a:p>
+            <a:pPr lvl="1"/>
+            <a:r>
+              <a:rPr lang="en-US" sz="1400" dirty="0"/>
+              <a:t>Bin Companies, years of experience, states and by data count size</a:t>
+            </a:r>
+          </a:p>
+          <a:p>
+            <a:pPr lvl="1"/>
+            <a:r>
+              <a:rPr lang="en-US" sz="1400" dirty="0" err="1"/>
+              <a:t>OneHotEncoder</a:t>
+            </a:r>
+            <a:r>
+              <a:rPr lang="en-US" sz="1400" dirty="0"/>
+              <a:t> all the object column</a:t>
+            </a:r>
+          </a:p>
+          <a:p>
+            <a:r>
+              <a:rPr lang="en-US" dirty="0"/>
               <a:t>Description of Database component </a:t>
             </a:r>
           </a:p>
           <a:p>
             <a:pPr lvl="1"/>
             <a:r>
-              <a:rPr lang="en-US" dirty="0">
-                <a:highlight>
-                  <a:srgbClr val="0000FF"/>
-                </a:highlight>
-              </a:rPr>
-              <a:t>Connected to AWS through </a:t>
-            </a:r>
-            <a:r>
-              <a:rPr lang="en-US" dirty="0" err="1">
-                <a:highlight>
-                  <a:srgbClr val="0000FF"/>
-                </a:highlight>
-              </a:rPr>
+              <a:rPr lang="en-US" dirty="0"/>
+              <a:t>Connected local Postgres to AWS server using </a:t>
+            </a:r>
+            <a:r>
+              <a:rPr lang="en-US" dirty="0" err="1"/>
+              <a:t>pgAdmin</a:t>
+            </a:r>
+            <a:r>
+              <a:rPr lang="en-US" dirty="0"/>
+              <a:t> with </a:t>
+            </a:r>
+            <a:r>
+              <a:rPr lang="en-US" dirty="0" err="1"/>
               <a:t>pyspark</a:t>
             </a:r>
             <a:r>
-              <a:rPr lang="en-US" dirty="0">
-                <a:highlight>
-                  <a:srgbClr val="0000FF"/>
-                </a:highlight>
-              </a:rPr>
-              <a:t>, </a:t>
-            </a:r>
-            <a:r>
-              <a:rPr lang="en-US" dirty="0" err="1">
-                <a:highlight>
-                  <a:srgbClr val="0000FF"/>
-                </a:highlight>
-              </a:rPr>
-              <a:t>etc</a:t>
-            </a:r>
-            <a:endParaRPr lang="en-US" dirty="0">
-              <a:highlight>
-                <a:srgbClr val="0000FF"/>
-              </a:highlight>
-            </a:endParaRPr>
+              <a:rPr lang="en-US" dirty="0"/>
+              <a:t> in Google </a:t>
+            </a:r>
+            <a:r>
+              <a:rPr lang="en-US" dirty="0" err="1"/>
+              <a:t>colab</a:t>
+            </a:r>
+            <a:r>
+              <a:rPr lang="en-US" dirty="0"/>
+              <a:t>. </a:t>
+            </a:r>
           </a:p>
         </p:txBody>
       </p:sp>
@@ -4971,7 +5472,7 @@
           <p:cNvPr id="2" name="Title 1">
             <a:extLst>
               <a:ext uri="{FF2B5EF4-FFF2-40B4-BE49-F238E27FC236}">
-                <a16:creationId xmlns:a16="http://schemas.microsoft.com/office/drawing/2014/main" id="{6673BA48-93F1-ED48-B9DB-43759B0A978A}"/>
+                <a16:creationId xmlns:a16="http://schemas.microsoft.com/office/drawing/2014/main" id="{2F2225FF-90D7-CB41-BE6C-60E0A4593CE3}"/>
               </a:ext>
             </a:extLst>
           </p:cNvPr>
@@ -4987,10 +5488,9 @@
           <a:bodyPr/>
           <a:lstStyle/>
           <a:p>
-            <a:pPr algn="ctr"/>
-            <a:r>
-              <a:rPr lang="en-US" dirty="0"/>
-              <a:t>Analysis of Data – Machine Learning Model</a:t>
+            <a:r>
+              <a:rPr lang="en-US" dirty="0"/>
+              <a:t>Machine Learning Model Selection</a:t>
             </a:r>
           </a:p>
         </p:txBody>
@@ -5000,7 +5500,7 @@
           <p:cNvPr id="3" name="Content Placeholder 2">
             <a:extLst>
               <a:ext uri="{FF2B5EF4-FFF2-40B4-BE49-F238E27FC236}">
-                <a16:creationId xmlns:a16="http://schemas.microsoft.com/office/drawing/2014/main" id="{22CA3922-375F-6C42-9A3E-C4E3FC659054}"/>
+                <a16:creationId xmlns:a16="http://schemas.microsoft.com/office/drawing/2014/main" id="{13ABB336-F03E-2D4C-9746-3D743FFF3B46}"/>
               </a:ext>
             </a:extLst>
           </p:cNvPr>
@@ -5017,62 +5517,39 @@
           <a:lstStyle/>
           <a:p>
             <a:r>
-              <a:rPr lang="en-US" dirty="0">
-                <a:highlight>
-                  <a:srgbClr val="0000FF"/>
-                </a:highlight>
-              </a:rPr>
-              <a:t>Preliminary feature engineering/selection and decision making process</a:t>
-            </a:r>
-          </a:p>
-          <a:p>
-            <a:r>
-              <a:rPr lang="en-US" dirty="0">
-                <a:highlight>
-                  <a:srgbClr val="0000FF"/>
-                </a:highlight>
-              </a:rPr>
-              <a:t>How was data split into training and testing sets</a:t>
-            </a:r>
-          </a:p>
-          <a:p>
-            <a:r>
-              <a:rPr lang="en-US" dirty="0">
-                <a:highlight>
-                  <a:srgbClr val="0000FF"/>
-                </a:highlight>
-              </a:rPr>
-              <a:t>Explanation of our model choice </a:t>
-            </a:r>
-          </a:p>
-          <a:p>
-            <a:pPr lvl="1"/>
-            <a:r>
-              <a:rPr lang="en-US" dirty="0">
-                <a:highlight>
-                  <a:srgbClr val="0000FF"/>
-                </a:highlight>
-              </a:rPr>
-              <a:t>Benefits</a:t>
-            </a:r>
-          </a:p>
-          <a:p>
-            <a:pPr lvl="1"/>
-            <a:r>
-              <a:rPr lang="en-US" dirty="0">
-                <a:highlight>
-                  <a:srgbClr val="0000FF"/>
-                </a:highlight>
-              </a:rPr>
-              <a:t>limitations </a:t>
-            </a:r>
+              <a:rPr lang="en-US" dirty="0"/>
+              <a:t>Once the data was clean we did visualizations of the data to decide which models may lend itself better to the data</a:t>
+            </a:r>
+          </a:p>
+          <a:p>
+            <a:r>
+              <a:rPr lang="en-US" dirty="0"/>
+              <a:t>We initially decided upon a linear model because what we were trying to find was a correlation rather than a classification</a:t>
+            </a:r>
+          </a:p>
+          <a:p>
+            <a:r>
+              <a:rPr lang="en-US" dirty="0"/>
+              <a:t>Once we tired to linear regression model we decided to explore and build upon it with the Random Forest Regressor  </a:t>
+            </a:r>
+          </a:p>
+          <a:p>
+            <a:r>
+              <a:rPr lang="en-US" dirty="0"/>
+              <a:t>To see if we could improve the model and employ skills learned in class we also tested with a </a:t>
+            </a:r>
+            <a:r>
+              <a:rPr lang="en-US"/>
+              <a:t>Neural Network</a:t>
+            </a:r>
+            <a:endParaRPr lang="en-US" dirty="0"/>
           </a:p>
         </p:txBody>
       </p:sp>
     </p:spTree>
     <p:extLst>
       <p:ext uri="{BB962C8B-B14F-4D97-AF65-F5344CB8AC3E}">
-        <p14:creationId xmlns:p14="http://schemas.microsoft.com/office/powerpoint/2010/main" val="2629001760"/>
+        <p14:creationId xmlns:p14="http://schemas.microsoft.com/office/powerpoint/2010/main" val="1814165626"/>
       </p:ext>
     </p:extLst>
   </p:cSld>
@@ -5104,7 +5581,7 @@
           <p:cNvPr id="2" name="Title 1">
             <a:extLst>
               <a:ext uri="{FF2B5EF4-FFF2-40B4-BE49-F238E27FC236}">
-                <a16:creationId xmlns:a16="http://schemas.microsoft.com/office/drawing/2014/main" id="{E14C30F9-2C2A-CF42-8362-673CA68073AD}"/>
+                <a16:creationId xmlns:a16="http://schemas.microsoft.com/office/drawing/2014/main" id="{6673BA48-93F1-ED48-B9DB-43759B0A978A}"/>
               </a:ext>
             </a:extLst>
           </p:cNvPr>
@@ -5115,7 +5592,12 @@
             <p:ph type="title"/>
           </p:nvPr>
         </p:nvSpPr>
-        <p:spPr/>
+        <p:spPr>
+          <a:xfrm>
+            <a:off x="2348608" y="336287"/>
+            <a:ext cx="7958331" cy="1077229"/>
+          </a:xfrm>
+        </p:spPr>
         <p:txBody>
           <a:bodyPr/>
           <a:lstStyle/>
@@ -5123,7 +5605,7 @@
             <a:pPr algn="ctr"/>
             <a:r>
               <a:rPr lang="en-US" dirty="0"/>
-              <a:t>Interactive Dashboard </a:t>
+              <a:t>Analysis of Data – Using Linear Regression Machine Learning Model</a:t>
             </a:r>
           </a:p>
         </p:txBody>
@@ -5133,7 +5615,7 @@
           <p:cNvPr id="3" name="Content Placeholder 2">
             <a:extLst>
               <a:ext uri="{FF2B5EF4-FFF2-40B4-BE49-F238E27FC236}">
-                <a16:creationId xmlns:a16="http://schemas.microsoft.com/office/drawing/2014/main" id="{3A953790-1F79-DF4B-BC49-F59AEB2E35DE}"/>
+                <a16:creationId xmlns:a16="http://schemas.microsoft.com/office/drawing/2014/main" id="{22CA3922-375F-6C42-9A3E-C4E3FC659054}"/>
               </a:ext>
             </a:extLst>
           </p:cNvPr>
@@ -5144,47 +5626,151 @@
             <p:ph idx="1"/>
           </p:nvPr>
         </p:nvSpPr>
-        <p:spPr/>
-        <p:txBody>
-          <a:bodyPr/>
-          <a:lstStyle/>
-          <a:p>
-            <a:r>
-              <a:rPr lang="en-US" dirty="0"/>
-              <a:t>The tools that will be used to create our dashboard are:</a:t>
+        <p:spPr>
+          <a:xfrm>
+            <a:off x="2429503" y="1514745"/>
+            <a:ext cx="7796540" cy="4807397"/>
+          </a:xfrm>
+        </p:spPr>
+        <p:txBody>
+          <a:bodyPr>
+            <a:normAutofit fontScale="85000" lnSpcReduction="20000"/>
+          </a:bodyPr>
+          <a:lstStyle/>
+          <a:p>
+            <a:r>
+              <a:rPr lang="en-US" dirty="0"/>
+              <a:t>How was data split into training and testing sets:</a:t>
             </a:r>
           </a:p>
           <a:p>
             <a:pPr lvl="1"/>
             <a:r>
-              <a:rPr lang="en-US" dirty="0">
-                <a:highlight>
-                  <a:srgbClr val="0000FF"/>
-                </a:highlight>
-              </a:rPr>
-              <a:t>X list of tools we will use</a:t>
+              <a:rPr lang="en-US" dirty="0"/>
+              <a:t>We used both the default settings (75/25) and 80/20</a:t>
+            </a:r>
+          </a:p>
+          <a:p>
+            <a:endParaRPr lang="en-US" dirty="0">
+              <a:highlight>
+                <a:srgbClr val="0000FF"/>
+              </a:highlight>
+            </a:endParaRPr>
+          </a:p>
+          <a:p>
+            <a:endParaRPr lang="en-US" dirty="0">
+              <a:highlight>
+                <a:srgbClr val="0000FF"/>
+              </a:highlight>
+            </a:endParaRPr>
+          </a:p>
+          <a:p>
+            <a:endParaRPr lang="en-US" dirty="0">
+              <a:highlight>
+                <a:srgbClr val="0000FF"/>
+              </a:highlight>
+            </a:endParaRPr>
+          </a:p>
+          <a:p>
+            <a:endParaRPr lang="en-US" dirty="0">
+              <a:highlight>
+                <a:srgbClr val="0000FF"/>
+              </a:highlight>
+            </a:endParaRPr>
+          </a:p>
+          <a:p>
+            <a:endParaRPr lang="en-US" dirty="0">
+              <a:highlight>
+                <a:srgbClr val="0000FF"/>
+              </a:highlight>
+            </a:endParaRPr>
+          </a:p>
+          <a:p>
+            <a:r>
+              <a:rPr lang="en-US" dirty="0"/>
+              <a:t>Explanation of our model choice </a:t>
             </a:r>
           </a:p>
           <a:p>
             <a:pPr lvl="1"/>
             <a:r>
               <a:rPr lang="en-US" dirty="0"/>
-              <a:t>Tableau to create interactive visuals for the user </a:t>
+              <a:t>Benefits: Find the relationship between variables (Total Annual Salary vs other factors), to construct a linear equation to the observed data. </a:t>
             </a:r>
           </a:p>
           <a:p>
             <a:pPr lvl="1"/>
             <a:r>
               <a:rPr lang="en-US" dirty="0"/>
-              <a:t>GitHub Pages to host</a:t>
-            </a:r>
-          </a:p>
-        </p:txBody>
-      </p:sp>
+              <a:t>Limitations: Some features of the dataset may not be linear correlated with the Salary </a:t>
+            </a:r>
+          </a:p>
+        </p:txBody>
+      </p:sp>
+      <p:pic>
+        <p:nvPicPr>
+          <p:cNvPr id="5" name="Picture 4">
+            <a:extLst>
+              <a:ext uri="{FF2B5EF4-FFF2-40B4-BE49-F238E27FC236}">
+                <a16:creationId xmlns:a16="http://schemas.microsoft.com/office/drawing/2014/main" id="{FC1178CB-481B-4732-8076-2FCBFDE9468A}"/>
+              </a:ext>
+            </a:extLst>
+          </p:cNvPr>
+          <p:cNvPicPr>
+            <a:picLocks noChangeAspect="1"/>
+          </p:cNvPicPr>
+          <p:nvPr/>
+        </p:nvPicPr>
+        <p:blipFill>
+          <a:blip r:embed="rId2"/>
+          <a:stretch>
+            <a:fillRect/>
+          </a:stretch>
+        </p:blipFill>
+        <p:spPr>
+          <a:xfrm>
+            <a:off x="2858136" y="2271840"/>
+            <a:ext cx="3618812" cy="942649"/>
+          </a:xfrm>
+          <a:prstGeom prst="rect">
+            <a:avLst/>
+          </a:prstGeom>
+        </p:spPr>
+      </p:pic>
+      <p:pic>
+        <p:nvPicPr>
+          <p:cNvPr id="7" name="Picture 6">
+            <a:extLst>
+              <a:ext uri="{FF2B5EF4-FFF2-40B4-BE49-F238E27FC236}">
+                <a16:creationId xmlns:a16="http://schemas.microsoft.com/office/drawing/2014/main" id="{769A6F7D-F40A-4667-AB27-0E58CBFB05B6}"/>
+              </a:ext>
+            </a:extLst>
+          </p:cNvPr>
+          <p:cNvPicPr>
+            <a:picLocks noChangeAspect="1"/>
+          </p:cNvPicPr>
+          <p:nvPr/>
+        </p:nvPicPr>
+        <p:blipFill>
+          <a:blip r:embed="rId3"/>
+          <a:stretch>
+            <a:fillRect/>
+          </a:stretch>
+        </p:blipFill>
+        <p:spPr>
+          <a:xfrm>
+            <a:off x="3001632" y="3286310"/>
+            <a:ext cx="2761550" cy="1370547"/>
+          </a:xfrm>
+          <a:prstGeom prst="rect">
+            <a:avLst/>
+          </a:prstGeom>
+        </p:spPr>
+      </p:pic>
     </p:spTree>
     <p:extLst>
       <p:ext uri="{BB962C8B-B14F-4D97-AF65-F5344CB8AC3E}">
-        <p14:creationId xmlns:p14="http://schemas.microsoft.com/office/powerpoint/2010/main" val="847010015"/>
+        <p14:creationId xmlns:p14="http://schemas.microsoft.com/office/powerpoint/2010/main" val="2629001760"/>
       </p:ext>
     </p:extLst>
   </p:cSld>
@@ -5213,10 +5799,10 @@
       </p:grpSpPr>
       <p:sp>
         <p:nvSpPr>
-          <p:cNvPr id="4" name="Title 3">
+          <p:cNvPr id="2" name="Title 1">
             <a:extLst>
               <a:ext uri="{FF2B5EF4-FFF2-40B4-BE49-F238E27FC236}">
-                <a16:creationId xmlns:a16="http://schemas.microsoft.com/office/drawing/2014/main" id="{5DD0D9A4-96F1-FC40-84B0-47FC29E56137}"/>
+                <a16:creationId xmlns:a16="http://schemas.microsoft.com/office/drawing/2014/main" id="{6673BA48-93F1-ED48-B9DB-43759B0A978A}"/>
               </a:ext>
             </a:extLst>
           </p:cNvPr>
@@ -5227,32 +5813,32 @@
             <p:ph type="title"/>
           </p:nvPr>
         </p:nvSpPr>
-        <p:spPr/>
-        <p:txBody>
-          <a:bodyPr/>
-          <a:lstStyle/>
-          <a:p>
-            <a:r>
-              <a:rPr lang="en-US" dirty="0"/>
-              <a:t>Storyboard: </a:t>
-            </a:r>
-            <a:r>
-              <a:rPr lang="en-US" dirty="0">
-                <a:highlight>
-                  <a:srgbClr val="0000FF"/>
-                </a:highlight>
-              </a:rPr>
-              <a:t>Image 1</a:t>
-            </a:r>
-          </a:p>
-        </p:txBody>
-      </p:sp>
-      <p:sp>
-        <p:nvSpPr>
-          <p:cNvPr id="5" name="Content Placeholder 4">
+        <p:spPr>
+          <a:xfrm>
+            <a:off x="2542981" y="645951"/>
+            <a:ext cx="7572427" cy="1077229"/>
+          </a:xfrm>
+        </p:spPr>
+        <p:txBody>
+          <a:bodyPr>
+            <a:normAutofit fontScale="90000"/>
+          </a:bodyPr>
+          <a:lstStyle/>
+          <a:p>
+            <a:pPr algn="ctr"/>
+            <a:r>
+              <a:rPr lang="en-US" dirty="0"/>
+              <a:t>Analysis of Data – Using Random Forest Regressor Machine Learning Model</a:t>
+            </a:r>
+          </a:p>
+        </p:txBody>
+      </p:sp>
+      <p:sp>
+        <p:nvSpPr>
+          <p:cNvPr id="3" name="Content Placeholder 2">
             <a:extLst>
               <a:ext uri="{FF2B5EF4-FFF2-40B4-BE49-F238E27FC236}">
-                <a16:creationId xmlns:a16="http://schemas.microsoft.com/office/drawing/2014/main" id="{2E3FA64B-9622-5A45-B84B-B1EE025856C4}"/>
+                <a16:creationId xmlns:a16="http://schemas.microsoft.com/office/drawing/2014/main" id="{22CA3922-375F-6C42-9A3E-C4E3FC659054}"/>
               </a:ext>
             </a:extLst>
           </p:cNvPr>
@@ -5263,58 +5849,117 @@
             <p:ph idx="1"/>
           </p:nvPr>
         </p:nvSpPr>
-        <p:spPr/>
-        <p:txBody>
-          <a:bodyPr/>
-          <a:lstStyle/>
-          <a:p>
-            <a:r>
-              <a:rPr lang="en-US" dirty="0">
-                <a:highlight>
-                  <a:srgbClr val="0000FF"/>
-                </a:highlight>
-              </a:rPr>
-              <a:t>Image here</a:t>
-            </a:r>
-          </a:p>
-        </p:txBody>
-      </p:sp>
-      <p:sp>
-        <p:nvSpPr>
-          <p:cNvPr id="6" name="Text Placeholder 5">
+        <p:spPr>
+          <a:xfrm>
+            <a:off x="2430924" y="1723180"/>
+            <a:ext cx="7796540" cy="4633910"/>
+          </a:xfrm>
+        </p:spPr>
+        <p:txBody>
+          <a:bodyPr>
+            <a:normAutofit fontScale="92500" lnSpcReduction="10000"/>
+          </a:bodyPr>
+          <a:lstStyle/>
+          <a:p>
+            <a:r>
+              <a:rPr lang="en-US" dirty="0"/>
+              <a:t>How was data split into training and testing sets</a:t>
+            </a:r>
+          </a:p>
+          <a:p>
+            <a:endParaRPr lang="en-US" dirty="0">
+              <a:highlight>
+                <a:srgbClr val="0000FF"/>
+              </a:highlight>
+            </a:endParaRPr>
+          </a:p>
+          <a:p>
+            <a:endParaRPr lang="en-US" dirty="0">
+              <a:highlight>
+                <a:srgbClr val="0000FF"/>
+              </a:highlight>
+            </a:endParaRPr>
+          </a:p>
+          <a:p>
+            <a:endParaRPr lang="en-US" dirty="0">
+              <a:highlight>
+                <a:srgbClr val="0000FF"/>
+              </a:highlight>
+            </a:endParaRPr>
+          </a:p>
+          <a:p>
+            <a:pPr marL="0" indent="0">
+              <a:buNone/>
+            </a:pPr>
+            <a:endParaRPr lang="en-US" dirty="0">
+              <a:highlight>
+                <a:srgbClr val="0000FF"/>
+              </a:highlight>
+            </a:endParaRPr>
+          </a:p>
+          <a:p>
+            <a:r>
+              <a:rPr lang="en-US" dirty="0"/>
+              <a:t>Explanation of our model choice</a:t>
+            </a:r>
+          </a:p>
+          <a:p>
+            <a:pPr lvl="1"/>
+            <a:r>
+              <a:rPr lang="en-US" dirty="0"/>
+              <a:t>Benefits: can  solve both regression and classification problems.</a:t>
+            </a:r>
+          </a:p>
+          <a:p>
+            <a:pPr lvl="2"/>
+            <a:r>
+              <a:rPr lang="en-US" dirty="0"/>
+              <a:t>This model didn’t require scaling the data</a:t>
+            </a:r>
+          </a:p>
+          <a:p>
+            <a:pPr lvl="1"/>
+            <a:r>
+              <a:rPr lang="en-US" dirty="0"/>
+              <a:t>Limitations: The ability to explain this model to stakeholders is a bit more “black box” than the Linear Regression</a:t>
+            </a:r>
+          </a:p>
+        </p:txBody>
+      </p:sp>
+      <p:pic>
+        <p:nvPicPr>
+          <p:cNvPr id="5" name="Picture 4">
             <a:extLst>
               <a:ext uri="{FF2B5EF4-FFF2-40B4-BE49-F238E27FC236}">
-                <a16:creationId xmlns:a16="http://schemas.microsoft.com/office/drawing/2014/main" id="{92D7F5F9-1D37-B641-AC5C-AF995E223840}"/>
+                <a16:creationId xmlns:a16="http://schemas.microsoft.com/office/drawing/2014/main" id="{FA335BEB-91A0-44BA-94C1-5EFC530D6A16}"/>
               </a:ext>
             </a:extLst>
           </p:cNvPr>
-          <p:cNvSpPr>
-            <a:spLocks noGrp="1"/>
-          </p:cNvSpPr>
-          <p:nvPr>
-            <p:ph type="body" sz="half" idx="2"/>
-          </p:nvPr>
-        </p:nvSpPr>
-        <p:spPr/>
-        <p:txBody>
-          <a:bodyPr/>
-          <a:lstStyle/>
-          <a:p>
-            <a:r>
-              <a:rPr lang="en-US" dirty="0">
-                <a:highlight>
-                  <a:srgbClr val="0000FF"/>
-                </a:highlight>
-              </a:rPr>
-              <a:t>Description of visual and any interactive features</a:t>
-            </a:r>
-          </a:p>
-        </p:txBody>
-      </p:sp>
+          <p:cNvPicPr>
+            <a:picLocks noChangeAspect="1"/>
+          </p:cNvPicPr>
+          <p:nvPr/>
+        </p:nvPicPr>
+        <p:blipFill>
+          <a:blip r:embed="rId2"/>
+          <a:stretch>
+            <a:fillRect/>
+          </a:stretch>
+        </p:blipFill>
+        <p:spPr>
+          <a:xfrm>
+            <a:off x="2831713" y="2129884"/>
+            <a:ext cx="4604812" cy="2327163"/>
+          </a:xfrm>
+          <a:prstGeom prst="rect">
+            <a:avLst/>
+          </a:prstGeom>
+        </p:spPr>
+      </p:pic>
     </p:spTree>
     <p:extLst>
       <p:ext uri="{BB962C8B-B14F-4D97-AF65-F5344CB8AC3E}">
-        <p14:creationId xmlns:p14="http://schemas.microsoft.com/office/powerpoint/2010/main" val="3510942167"/>
+        <p14:creationId xmlns:p14="http://schemas.microsoft.com/office/powerpoint/2010/main" val="852984465"/>
       </p:ext>
     </p:extLst>
   </p:cSld>
@@ -5343,10 +5988,10 @@
       </p:grpSpPr>
       <p:sp>
         <p:nvSpPr>
-          <p:cNvPr id="4" name="Title 3">
+          <p:cNvPr id="2" name="Title 1">
             <a:extLst>
               <a:ext uri="{FF2B5EF4-FFF2-40B4-BE49-F238E27FC236}">
-                <a16:creationId xmlns:a16="http://schemas.microsoft.com/office/drawing/2014/main" id="{5DD0D9A4-96F1-FC40-84B0-47FC29E56137}"/>
+                <a16:creationId xmlns:a16="http://schemas.microsoft.com/office/drawing/2014/main" id="{6673BA48-93F1-ED48-B9DB-43759B0A978A}"/>
               </a:ext>
             </a:extLst>
           </p:cNvPr>
@@ -5359,30 +6004,32 @@
         </p:nvSpPr>
         <p:spPr/>
         <p:txBody>
-          <a:bodyPr/>
-          <a:lstStyle/>
-          <a:p>
-            <a:r>
-              <a:rPr lang="en-US" dirty="0"/>
-              <a:t>Storyboard: </a:t>
-            </a:r>
-            <a:r>
-              <a:rPr lang="en-US" dirty="0">
-                <a:highlight>
-                  <a:srgbClr val="0000FF"/>
-                </a:highlight>
-              </a:rPr>
-              <a:t>Image 2</a:t>
-            </a:r>
-          </a:p>
-        </p:txBody>
-      </p:sp>
-      <p:sp>
-        <p:nvSpPr>
-          <p:cNvPr id="5" name="Content Placeholder 4">
+          <a:bodyPr>
+            <a:normAutofit/>
+          </a:bodyPr>
+          <a:lstStyle/>
+          <a:p>
+            <a:pPr algn="ctr"/>
+            <a:r>
+              <a:rPr lang="en-US" dirty="0"/>
+              <a:t>Cross Validation– Using Neural Network</a:t>
+            </a:r>
+            <a:br>
+              <a:rPr lang="en-US" dirty="0"/>
+            </a:br>
+            <a:r>
+              <a:rPr lang="en-US" dirty="0"/>
+              <a:t>Machine Learning Model</a:t>
+            </a:r>
+          </a:p>
+        </p:txBody>
+      </p:sp>
+      <p:sp>
+        <p:nvSpPr>
+          <p:cNvPr id="3" name="Content Placeholder 2">
             <a:extLst>
               <a:ext uri="{FF2B5EF4-FFF2-40B4-BE49-F238E27FC236}">
-                <a16:creationId xmlns:a16="http://schemas.microsoft.com/office/drawing/2014/main" id="{2E3FA64B-9622-5A45-B84B-B1EE025856C4}"/>
+                <a16:creationId xmlns:a16="http://schemas.microsoft.com/office/drawing/2014/main" id="{22CA3922-375F-6C42-9A3E-C4E3FC659054}"/>
               </a:ext>
             </a:extLst>
           </p:cNvPr>
@@ -5393,50 +6040,67 @@
             <p:ph idx="1"/>
           </p:nvPr>
         </p:nvSpPr>
-        <p:spPr/>
-        <p:txBody>
-          <a:bodyPr/>
-          <a:lstStyle/>
-          <a:p>
-            <a:r>
-              <a:rPr lang="en-US" dirty="0">
-                <a:highlight>
-                  <a:srgbClr val="0000FF"/>
-                </a:highlight>
-              </a:rPr>
-              <a:t>Image here</a:t>
-            </a:r>
-          </a:p>
-        </p:txBody>
-      </p:sp>
-      <p:sp>
-        <p:nvSpPr>
-          <p:cNvPr id="6" name="Text Placeholder 5">
-            <a:extLst>
-              <a:ext uri="{FF2B5EF4-FFF2-40B4-BE49-F238E27FC236}">
-                <a16:creationId xmlns:a16="http://schemas.microsoft.com/office/drawing/2014/main" id="{92D7F5F9-1D37-B641-AC5C-AF995E223840}"/>
-              </a:ext>
-            </a:extLst>
-          </p:cNvPr>
-          <p:cNvSpPr>
-            <a:spLocks noGrp="1"/>
-          </p:cNvSpPr>
-          <p:nvPr>
-            <p:ph type="body" sz="half" idx="2"/>
-          </p:nvPr>
-        </p:nvSpPr>
-        <p:spPr/>
-        <p:txBody>
-          <a:bodyPr/>
-          <a:lstStyle/>
-          <a:p>
-            <a:r>
-              <a:rPr lang="en-US" dirty="0">
-                <a:highlight>
-                  <a:srgbClr val="0000FF"/>
-                </a:highlight>
-              </a:rPr>
-              <a:t>Description of visual and any interactive features</a:t>
+        <p:spPr>
+          <a:xfrm>
+            <a:off x="2773599" y="2052116"/>
+            <a:ext cx="7796540" cy="4633910"/>
+          </a:xfrm>
+        </p:spPr>
+        <p:txBody>
+          <a:bodyPr>
+            <a:normAutofit/>
+          </a:bodyPr>
+          <a:lstStyle/>
+          <a:p>
+            <a:r>
+              <a:rPr lang="en-US" dirty="0"/>
+              <a:t>How was data split into training and testing sets:</a:t>
+            </a:r>
+          </a:p>
+          <a:p>
+            <a:pPr lvl="1"/>
+            <a:r>
+              <a:rPr lang="en-US" dirty="0"/>
+              <a:t>We used the standard train test split</a:t>
+            </a:r>
+            <a:endParaRPr lang="en-US" dirty="0">
+              <a:highlight>
+                <a:srgbClr val="0000FF"/>
+              </a:highlight>
+            </a:endParaRPr>
+          </a:p>
+          <a:p>
+            <a:r>
+              <a:rPr lang="en-US" dirty="0"/>
+              <a:t>Explanation of our model choice </a:t>
+            </a:r>
+          </a:p>
+          <a:p>
+            <a:pPr lvl="1"/>
+            <a:r>
+              <a:rPr lang="en-US" dirty="0"/>
+              <a:t>Benefits: </a:t>
+            </a:r>
+          </a:p>
+          <a:p>
+            <a:pPr lvl="2"/>
+            <a:r>
+              <a:rPr lang="en-US" dirty="0"/>
+              <a:t>It is a more sophisticated model, however our amount of data did not really lend itself to this type of model </a:t>
+            </a:r>
+          </a:p>
+          <a:p>
+            <a:pPr lvl="1"/>
+            <a:r>
+              <a:rPr lang="en-US" dirty="0"/>
+              <a:t>Limitations: </a:t>
+            </a:r>
+          </a:p>
+          <a:p>
+            <a:pPr lvl="2"/>
+            <a:r>
+              <a:rPr lang="en-US" dirty="0"/>
+              <a:t>The amount of data we had, the model would perform better with more data</a:t>
             </a:r>
           </a:p>
         </p:txBody>
@@ -5444,7 +6108,7 @@
     </p:spTree>
     <p:extLst>
       <p:ext uri="{BB962C8B-B14F-4D97-AF65-F5344CB8AC3E}">
-        <p14:creationId xmlns:p14="http://schemas.microsoft.com/office/powerpoint/2010/main" val="2104079767"/>
+        <p14:creationId xmlns:p14="http://schemas.microsoft.com/office/powerpoint/2010/main" val="1445532845"/>
       </p:ext>
     </p:extLst>
   </p:cSld>
@@ -5473,10 +6137,10 @@
       </p:grpSpPr>
       <p:sp>
         <p:nvSpPr>
-          <p:cNvPr id="4" name="Title 3">
+          <p:cNvPr id="2" name="Title 1">
             <a:extLst>
               <a:ext uri="{FF2B5EF4-FFF2-40B4-BE49-F238E27FC236}">
-                <a16:creationId xmlns:a16="http://schemas.microsoft.com/office/drawing/2014/main" id="{5DD0D9A4-96F1-FC40-84B0-47FC29E56137}"/>
+                <a16:creationId xmlns:a16="http://schemas.microsoft.com/office/drawing/2014/main" id="{E14C30F9-2C2A-CF42-8362-673CA68073AD}"/>
               </a:ext>
             </a:extLst>
           </p:cNvPr>
@@ -5492,94 +6156,114 @@
           <a:bodyPr/>
           <a:lstStyle/>
           <a:p>
-            <a:r>
-              <a:rPr lang="en-US" dirty="0"/>
-              <a:t>Storyboard: </a:t>
-            </a:r>
-            <a:r>
-              <a:rPr lang="en-US">
-                <a:highlight>
-                  <a:srgbClr val="0000FF"/>
-                </a:highlight>
-              </a:rPr>
-              <a:t>Image 3</a:t>
-            </a:r>
+            <a:pPr algn="ctr"/>
+            <a:r>
+              <a:rPr lang="en-US" dirty="0"/>
+              <a:t>Interactive Dashboard </a:t>
+            </a:r>
+          </a:p>
+        </p:txBody>
+      </p:sp>
+      <p:sp>
+        <p:nvSpPr>
+          <p:cNvPr id="3" name="Content Placeholder 2">
+            <a:extLst>
+              <a:ext uri="{FF2B5EF4-FFF2-40B4-BE49-F238E27FC236}">
+                <a16:creationId xmlns:a16="http://schemas.microsoft.com/office/drawing/2014/main" id="{3A953790-1F79-DF4B-BC49-F59AEB2E35DE}"/>
+              </a:ext>
+            </a:extLst>
+          </p:cNvPr>
+          <p:cNvSpPr>
+            <a:spLocks noGrp="1"/>
+          </p:cNvSpPr>
+          <p:nvPr>
+            <p:ph idx="1"/>
+          </p:nvPr>
+        </p:nvSpPr>
+        <p:spPr>
+          <a:xfrm>
+            <a:off x="2611808" y="1714067"/>
+            <a:ext cx="7796540" cy="3997828"/>
+          </a:xfrm>
+        </p:spPr>
+        <p:txBody>
+          <a:bodyPr>
+            <a:normAutofit/>
+          </a:bodyPr>
+          <a:lstStyle/>
+          <a:p>
+            <a:r>
+              <a:rPr lang="en-US" dirty="0"/>
+              <a:t>We will create a website that displays our findings </a:t>
+            </a:r>
+          </a:p>
+          <a:p>
+            <a:r>
+              <a:rPr lang="en-US" dirty="0"/>
+              <a:t>The tools that will be used to create our dashboard are:</a:t>
+            </a:r>
+          </a:p>
+          <a:p>
+            <a:pPr lvl="1"/>
+            <a:r>
+              <a:rPr lang="en-US" dirty="0"/>
+              <a:t>Tools we will use:</a:t>
+            </a:r>
+          </a:p>
+          <a:p>
+            <a:pPr lvl="2"/>
+            <a:r>
+              <a:rPr lang="en-US" dirty="0"/>
+              <a:t>Bootstrap</a:t>
+            </a:r>
+          </a:p>
+          <a:p>
+            <a:pPr lvl="2"/>
+            <a:r>
+              <a:rPr lang="en-US" dirty="0"/>
+              <a:t>Html</a:t>
+            </a:r>
+          </a:p>
+          <a:p>
+            <a:pPr lvl="2"/>
+            <a:r>
+              <a:rPr lang="en-US" dirty="0" err="1"/>
+              <a:t>Github</a:t>
+            </a:r>
+            <a:r>
+              <a:rPr lang="en-US" dirty="0"/>
+              <a:t> Pages to host</a:t>
+            </a:r>
+          </a:p>
+          <a:p>
+            <a:pPr lvl="2"/>
+            <a:r>
+              <a:rPr lang="en-US" dirty="0"/>
+              <a:t>Tableau to create interactive visuals for the user </a:t>
+            </a:r>
+          </a:p>
+          <a:p>
+            <a:pPr lvl="2"/>
             <a:endParaRPr lang="en-US" dirty="0">
               <a:highlight>
                 <a:srgbClr val="0000FF"/>
               </a:highlight>
             </a:endParaRPr>
           </a:p>
-        </p:txBody>
-      </p:sp>
-      <p:sp>
-        <p:nvSpPr>
-          <p:cNvPr id="5" name="Content Placeholder 4">
-            <a:extLst>
-              <a:ext uri="{FF2B5EF4-FFF2-40B4-BE49-F238E27FC236}">
-                <a16:creationId xmlns:a16="http://schemas.microsoft.com/office/drawing/2014/main" id="{2E3FA64B-9622-5A45-B84B-B1EE025856C4}"/>
-              </a:ext>
-            </a:extLst>
-          </p:cNvPr>
-          <p:cNvSpPr>
-            <a:spLocks noGrp="1"/>
-          </p:cNvSpPr>
-          <p:nvPr>
-            <p:ph idx="1"/>
-          </p:nvPr>
-        </p:nvSpPr>
-        <p:spPr/>
-        <p:txBody>
-          <a:bodyPr/>
-          <a:lstStyle/>
-          <a:p>
-            <a:r>
-              <a:rPr lang="en-US" dirty="0">
-                <a:highlight>
-                  <a:srgbClr val="0000FF"/>
-                </a:highlight>
-              </a:rPr>
-              <a:t>Image here</a:t>
-            </a:r>
-          </a:p>
-        </p:txBody>
-      </p:sp>
-      <p:sp>
-        <p:nvSpPr>
-          <p:cNvPr id="6" name="Text Placeholder 5">
-            <a:extLst>
-              <a:ext uri="{FF2B5EF4-FFF2-40B4-BE49-F238E27FC236}">
-                <a16:creationId xmlns:a16="http://schemas.microsoft.com/office/drawing/2014/main" id="{92D7F5F9-1D37-B641-AC5C-AF995E223840}"/>
-              </a:ext>
-            </a:extLst>
-          </p:cNvPr>
-          <p:cNvSpPr>
-            <a:spLocks noGrp="1"/>
-          </p:cNvSpPr>
-          <p:nvPr>
-            <p:ph type="body" sz="half" idx="2"/>
-          </p:nvPr>
-        </p:nvSpPr>
-        <p:spPr/>
-        <p:txBody>
-          <a:bodyPr/>
-          <a:lstStyle/>
-          <a:p>
-            <a:r>
-              <a:rPr lang="en-US" dirty="0">
-                <a:highlight>
-                  <a:srgbClr val="0000FF"/>
-                </a:highlight>
-              </a:rPr>
-              <a:t>Description of visual and any interactive features</a:t>
-            </a:r>
+          <a:p>
+            <a:pPr lvl="2"/>
+            <a:endParaRPr lang="en-US" dirty="0">
+              <a:highlight>
+                <a:srgbClr val="0000FF"/>
+              </a:highlight>
+            </a:endParaRPr>
           </a:p>
         </p:txBody>
       </p:sp>
     </p:spTree>
     <p:extLst>
       <p:ext uri="{BB962C8B-B14F-4D97-AF65-F5344CB8AC3E}">
-        <p14:creationId xmlns:p14="http://schemas.microsoft.com/office/powerpoint/2010/main" val="3077606392"/>
+        <p14:creationId xmlns:p14="http://schemas.microsoft.com/office/powerpoint/2010/main" val="847010015"/>
       </p:ext>
     </p:extLst>
   </p:cSld>

</xml_diff>

<commit_message>
uploading visuals, updated slides, and slides as PDF
</commit_message>
<xml_diff>
--- a/2nd Segment Project Deliverable/Deliverable2_Storyboard.pptx
+++ b/2nd Segment Project Deliverable/Deliverable2_Storyboard.pptx
@@ -17,6 +17,7 @@
     <p:sldId id="262" r:id="rId11"/>
     <p:sldId id="263" r:id="rId12"/>
     <p:sldId id="268" r:id="rId13"/>
+    <p:sldId id="270" r:id="rId14"/>
   </p:sldIdLst>
   <p:sldSz cx="12192000" cy="6858000"/>
   <p:notesSz cx="6858000" cy="9144000"/>
@@ -340,7 +341,7 @@
           <a:p>
             <a:fld id="{9AB3A824-1A51-4B26-AD58-A6D8E14F6C04}" type="datetimeFigureOut">
               <a:rPr lang="en-US" dirty="0"/>
-              <a:t>3/24/22</a:t>
+              <a:t>3/25/22</a:t>
             </a:fld>
             <a:endParaRPr lang="en-US" dirty="0"/>
           </a:p>
@@ -674,7 +675,7 @@
           <a:p>
             <a:fld id="{D857E33E-8B18-4087-B112-809917729534}" type="datetimeFigureOut">
               <a:rPr lang="en-US" dirty="0"/>
-              <a:t>3/24/22</a:t>
+              <a:t>3/25/22</a:t>
             </a:fld>
             <a:endParaRPr lang="en-US" dirty="0"/>
           </a:p>
@@ -976,7 +977,7 @@
           <a:p>
             <a:fld id="{D3FFE419-2371-464F-8239-3959401C3561}" type="datetimeFigureOut">
               <a:rPr lang="en-US" dirty="0"/>
-              <a:t>3/24/22</a:t>
+              <a:t>3/25/22</a:t>
             </a:fld>
             <a:endParaRPr lang="en-US" dirty="0"/>
           </a:p>
@@ -1223,7 +1224,7 @@
           <a:p>
             <a:fld id="{97D162C4-EDD9-4389-A98B-B87ECEA2A816}" type="datetimeFigureOut">
               <a:rPr lang="en-US" dirty="0"/>
-              <a:t>3/24/22</a:t>
+              <a:t>3/25/22</a:t>
             </a:fld>
             <a:endParaRPr lang="en-US" dirty="0"/>
           </a:p>
@@ -1630,7 +1631,7 @@
           <a:p>
             <a:fld id="{3E5059C3-6A89-4494-99FF-5A4D6FFD50EB}" type="datetimeFigureOut">
               <a:rPr lang="en-US" dirty="0"/>
-              <a:t>3/24/22</a:t>
+              <a:t>3/25/22</a:t>
             </a:fld>
             <a:endParaRPr lang="en-US" dirty="0"/>
           </a:p>
@@ -1944,7 +1945,7 @@
           <a:p>
             <a:fld id="{CA954B2F-12DE-47F5-8894-472B206D2E1E}" type="datetimeFigureOut">
               <a:rPr lang="en-US" dirty="0"/>
-              <a:t>3/24/22</a:t>
+              <a:t>3/25/22</a:t>
             </a:fld>
             <a:endParaRPr lang="en-US" dirty="0"/>
           </a:p>
@@ -2488,7 +2489,7 @@
           <a:p>
             <a:fld id="{3F30E46F-7819-4ACF-B48B-48222C2ACC88}" type="datetimeFigureOut">
               <a:rPr lang="en-US" dirty="0"/>
-              <a:t>3/24/22</a:t>
+              <a:t>3/25/22</a:t>
             </a:fld>
             <a:endParaRPr lang="en-US" dirty="0"/>
           </a:p>
@@ -2683,7 +2684,7 @@
           <a:p>
             <a:fld id="{1FAF3416-4057-4DAA-829D-4CA07428D088}" type="datetimeFigureOut">
               <a:rPr lang="en-US" dirty="0"/>
-              <a:t>3/24/22</a:t>
+              <a:t>3/25/22</a:t>
             </a:fld>
             <a:endParaRPr lang="en-US" dirty="0"/>
           </a:p>
@@ -2896,7 +2897,7 @@
           <a:p>
             <a:fld id="{921D9284-D300-4297-87F7-E791DCC15DB1}" type="datetimeFigureOut">
               <a:rPr lang="en-US" dirty="0"/>
-              <a:t>3/24/22</a:t>
+              <a:t>3/25/22</a:t>
             </a:fld>
             <a:endParaRPr lang="en-US" dirty="0"/>
           </a:p>
@@ -3265,7 +3266,7 @@
           <a:p>
             <a:fld id="{37D525BB-DA17-4BA0-B3C8-3AC3ABC827E6}" type="datetimeFigureOut">
               <a:rPr lang="en-US" dirty="0"/>
-              <a:t>3/24/22</a:t>
+              <a:t>3/25/22</a:t>
             </a:fld>
             <a:endParaRPr lang="en-US" dirty="0"/>
           </a:p>
@@ -3668,7 +3669,7 @@
           <a:p>
             <a:fld id="{B16C4C9A-3960-41CF-A4E9-2A8FB932454B}" type="datetimeFigureOut">
               <a:rPr lang="en-US" dirty="0"/>
-              <a:t>3/24/22</a:t>
+              <a:t>3/25/22</a:t>
             </a:fld>
             <a:endParaRPr lang="en-US" dirty="0"/>
           </a:p>
@@ -3979,7 +3980,7 @@
           <a:p>
             <a:fld id="{3CBC1C18-307B-4F68-A007-B5B542270E8D}" type="datetimeFigureOut">
               <a:rPr lang="en-US" dirty="0"/>
-              <a:t>3/24/22</a:t>
+              <a:t>3/25/22</a:t>
             </a:fld>
             <a:endParaRPr lang="en-US" dirty="0"/>
           </a:p>
@@ -4633,11 +4634,7 @@
           <a:lstStyle/>
           <a:p>
             <a:r>
-              <a:rPr lang="en-US" dirty="0">
-                <a:highlight>
-                  <a:srgbClr val="0000FF"/>
-                </a:highlight>
-              </a:rPr>
+              <a:rPr lang="en-US" dirty="0"/>
               <a:t>User can filter the titles and companies to see what skills are required or highly acquire by the current employees. </a:t>
             </a:r>
           </a:p>
@@ -4757,12 +4754,14 @@
         </p:nvSpPr>
         <p:spPr>
           <a:xfrm>
-            <a:off x="1970323" y="1282451"/>
-            <a:ext cx="6771005" cy="1903241"/>
-          </a:xfrm>
-        </p:spPr>
-        <p:txBody>
-          <a:bodyPr/>
+            <a:off x="1152270" y="90192"/>
+            <a:ext cx="3687359" cy="991476"/>
+          </a:xfrm>
+        </p:spPr>
+        <p:txBody>
+          <a:bodyPr>
+            <a:normAutofit fontScale="90000"/>
+          </a:bodyPr>
           <a:lstStyle/>
           <a:p>
             <a:r>
@@ -4773,11 +4772,7 @@
               <a:rPr lang="en-US" dirty="0"/>
             </a:br>
             <a:r>
-              <a:rPr lang="en-US" dirty="0">
-                <a:highlight>
-                  <a:srgbClr val="0000FF"/>
-                </a:highlight>
-              </a:rPr>
+              <a:rPr lang="en-US" dirty="0"/>
               <a:t>External factors that affect the average salary</a:t>
             </a:r>
           </a:p>
@@ -4831,22 +4826,97 @@
             <p:ph type="body" sz="half" idx="2"/>
           </p:nvPr>
         </p:nvSpPr>
-        <p:spPr/>
-        <p:txBody>
-          <a:bodyPr/>
-          <a:lstStyle/>
-          <a:p>
-            <a:r>
-              <a:rPr lang="en-US" dirty="0">
-                <a:highlight>
-                  <a:srgbClr val="0000FF"/>
-                </a:highlight>
-              </a:rPr>
-              <a:t>Description of visual and any interactive features</a:t>
-            </a:r>
-          </a:p>
-        </p:txBody>
-      </p:sp>
+        <p:spPr>
+          <a:xfrm>
+            <a:off x="1873411" y="1198600"/>
+            <a:ext cx="2664361" cy="4600034"/>
+          </a:xfrm>
+        </p:spPr>
+        <p:txBody>
+          <a:bodyPr>
+            <a:normAutofit fontScale="92500" lnSpcReduction="20000"/>
+          </a:bodyPr>
+          <a:lstStyle/>
+          <a:p>
+            <a:r>
+              <a:rPr lang="en-US" dirty="0"/>
+              <a:t>We will have a Tableau dashboard that is interactive for the user. They can filter on company name and city. It will show the number of reported data science employees for that company.</a:t>
+            </a:r>
+          </a:p>
+          <a:p>
+            <a:r>
+              <a:rPr lang="en-US" dirty="0"/>
+              <a:t>There is also a layer added to the map that has the per capita income of the state reported by Tableau.</a:t>
+            </a:r>
+          </a:p>
+          <a:p>
+            <a:r>
+              <a:rPr lang="en-US" sz="1200" dirty="0"/>
+              <a:t>https://</a:t>
+            </a:r>
+            <a:r>
+              <a:rPr lang="en-US" sz="1200" dirty="0" err="1"/>
+              <a:t>public.tableau.com</a:t>
+            </a:r>
+            <a:r>
+              <a:rPr lang="en-US" sz="1200" dirty="0"/>
+              <a:t>/app/profile/</a:t>
+            </a:r>
+            <a:r>
+              <a:rPr lang="en-US" sz="1200" dirty="0" err="1"/>
+              <a:t>mackenzie.coushay.richter</a:t>
+            </a:r>
+            <a:r>
+              <a:rPr lang="en-US" sz="1200" dirty="0"/>
+              <a:t>/viz/SalaryAnalysis-Summary_16482343926450/</a:t>
+            </a:r>
+            <a:r>
+              <a:rPr lang="en-US" sz="1200" dirty="0" err="1"/>
+              <a:t>location_dashboard?publish</a:t>
+            </a:r>
+            <a:r>
+              <a:rPr lang="en-US" sz="1200" dirty="0"/>
+              <a:t>=yes</a:t>
+            </a:r>
+          </a:p>
+          <a:p>
+            <a:r>
+              <a:rPr lang="en-US" dirty="0"/>
+              <a:t> </a:t>
+            </a:r>
+          </a:p>
+        </p:txBody>
+      </p:sp>
+      <p:pic>
+        <p:nvPicPr>
+          <p:cNvPr id="3" name="Picture 2" descr="Map, bubble chart&#10;&#10;Description automatically generated">
+            <a:extLst>
+              <a:ext uri="{FF2B5EF4-FFF2-40B4-BE49-F238E27FC236}">
+                <a16:creationId xmlns:a16="http://schemas.microsoft.com/office/drawing/2014/main" id="{5DAC488B-3E72-024D-9E17-801857407065}"/>
+              </a:ext>
+            </a:extLst>
+          </p:cNvPr>
+          <p:cNvPicPr>
+            <a:picLocks noChangeAspect="1"/>
+          </p:cNvPicPr>
+          <p:nvPr/>
+        </p:nvPicPr>
+        <p:blipFill>
+          <a:blip r:embed="rId2"/>
+          <a:stretch>
+            <a:fillRect/>
+          </a:stretch>
+        </p:blipFill>
+        <p:spPr>
+          <a:xfrm>
+            <a:off x="5120154" y="468077"/>
+            <a:ext cx="6028660" cy="6144596"/>
+          </a:xfrm>
+          <a:prstGeom prst="rect">
+            <a:avLst/>
+          </a:prstGeom>
+        </p:spPr>
+      </p:pic>
     </p:spTree>
     <p:extLst>
       <p:ext uri="{BB962C8B-B14F-4D97-AF65-F5344CB8AC3E}">
@@ -4863,6 +4933,15 @@
 <file path=ppt/slides/slide12.xml><?xml version="1.0" encoding="utf-8"?>
 <p:sld xmlns:a="http://schemas.openxmlformats.org/drawingml/2006/main" xmlns:r="http://schemas.openxmlformats.org/officeDocument/2006/relationships" xmlns:p="http://schemas.openxmlformats.org/presentationml/2006/main">
   <p:cSld>
+    <p:bg>
+      <p:bgPr>
+        <a:blipFill rotWithShape="1">
+          <a:blip r:embed="rId2"/>
+          <a:stretch/>
+        </a:blipFill>
+        <a:effectLst/>
+      </p:bgPr>
+    </p:bg>
     <p:spTree>
       <p:nvGrpSpPr>
         <p:cNvPr id="1" name=""/>
@@ -4877,6 +4956,659 @@
           <a:chExt cx="0" cy="0"/>
         </a:xfrm>
       </p:grpSpPr>
+      <p:pic>
+        <p:nvPicPr>
+          <p:cNvPr id="11" name="Picture 10">
+            <a:extLst>
+              <a:ext uri="{FF2B5EF4-FFF2-40B4-BE49-F238E27FC236}">
+                <a16:creationId xmlns:a16="http://schemas.microsoft.com/office/drawing/2014/main" id="{2FA3880A-8D8F-466C-A4A1-F07BCDD3719C}"/>
+              </a:ext>
+              <a:ext uri="{C183D7F6-B498-43B3-948B-1728B52AA6E4}">
+                <adec:decorative xmlns:adec="http://schemas.microsoft.com/office/drawing/2017/decorative" val="1"/>
+              </a:ext>
+            </a:extLst>
+          </p:cNvPr>
+          <p:cNvPicPr>
+            <a:picLocks noGrp="1" noRot="1" noChangeAspect="1" noMove="1" noResize="1" noEditPoints="1" noAdjustHandles="1" noChangeArrowheads="1" noChangeShapeType="1" noCrop="1"/>
+          </p:cNvPicPr>
+          <p:nvPr>
+            <p:extLst>
+              <p:ext uri="{386F3935-93C4-4BCD-93E2-E3B085C9AB24}">
+                <p16:designElem xmlns:p16="http://schemas.microsoft.com/office/powerpoint/2015/main" val="1"/>
+              </p:ext>
+            </p:extLst>
+          </p:nvPr>
+        </p:nvPicPr>
+        <p:blipFill>
+          <a:blip r:embed="rId3">
+            <a:extLst>
+              <a:ext uri="{28A0092B-C50C-407E-A947-70E740481C1C}">
+                <a14:useLocalDpi xmlns:a14="http://schemas.microsoft.com/office/drawing/2010/main" val="0"/>
+              </a:ext>
+            </a:extLst>
+          </a:blip>
+          <a:stretch>
+            <a:fillRect/>
+          </a:stretch>
+        </p:blipFill>
+        <p:spPr>
+          <a:xfrm>
+            <a:off x="2831794" y="2105202"/>
+            <a:ext cx="9360205" cy="4752798"/>
+          </a:xfrm>
+          <a:prstGeom prst="rect">
+            <a:avLst/>
+          </a:prstGeom>
+        </p:spPr>
+      </p:pic>
+      <p:pic>
+        <p:nvPicPr>
+          <p:cNvPr id="13" name="Picture 12">
+            <a:extLst>
+              <a:ext uri="{FF2B5EF4-FFF2-40B4-BE49-F238E27FC236}">
+                <a16:creationId xmlns:a16="http://schemas.microsoft.com/office/drawing/2014/main" id="{3C0A64CB-20A1-4508-B568-284EB04F78EE}"/>
+              </a:ext>
+              <a:ext uri="{C183D7F6-B498-43B3-948B-1728B52AA6E4}">
+                <adec:decorative xmlns:adec="http://schemas.microsoft.com/office/drawing/2017/decorative" val="1"/>
+              </a:ext>
+            </a:extLst>
+          </p:cNvPr>
+          <p:cNvPicPr>
+            <a:picLocks noGrp="1" noRot="1" noChangeAspect="1" noMove="1" noResize="1" noEditPoints="1" noAdjustHandles="1" noChangeArrowheads="1" noChangeShapeType="1" noCrop="1"/>
+          </p:cNvPicPr>
+          <p:nvPr>
+            <p:extLst>
+              <p:ext uri="{386F3935-93C4-4BCD-93E2-E3B085C9AB24}">
+                <p16:designElem xmlns:p16="http://schemas.microsoft.com/office/powerpoint/2015/main" val="1"/>
+              </p:ext>
+            </p:extLst>
+          </p:nvPr>
+        </p:nvPicPr>
+        <p:blipFill>
+          <a:blip r:embed="rId4">
+            <a:extLst>
+              <a:ext uri="{28A0092B-C50C-407E-A947-70E740481C1C}">
+                <a14:useLocalDpi xmlns:a14="http://schemas.microsoft.com/office/drawing/2010/main" val="0"/>
+              </a:ext>
+            </a:extLst>
+          </a:blip>
+          <a:stretch>
+            <a:fillRect/>
+          </a:stretch>
+        </p:blipFill>
+        <p:spPr>
+          <a:xfrm>
+            <a:off x="0" y="0"/>
+            <a:ext cx="12189867" cy="6858000"/>
+          </a:xfrm>
+          <a:prstGeom prst="rect">
+            <a:avLst/>
+          </a:prstGeom>
+        </p:spPr>
+      </p:pic>
+      <p:sp>
+        <p:nvSpPr>
+          <p:cNvPr id="15" name="Rectangle 14">
+            <a:extLst>
+              <a:ext uri="{FF2B5EF4-FFF2-40B4-BE49-F238E27FC236}">
+                <a16:creationId xmlns:a16="http://schemas.microsoft.com/office/drawing/2014/main" id="{8DA14841-53A4-4935-BE65-C8373B8A6D06}"/>
+              </a:ext>
+              <a:ext uri="{C183D7F6-B498-43B3-948B-1728B52AA6E4}">
+                <adec:decorative xmlns:adec="http://schemas.microsoft.com/office/drawing/2017/decorative" val="1"/>
+              </a:ext>
+            </a:extLst>
+          </p:cNvPr>
+          <p:cNvSpPr>
+            <a:spLocks noGrp="1" noRot="1" noChangeAspect="1" noMove="1" noResize="1" noEditPoints="1" noAdjustHandles="1" noChangeArrowheads="1" noChangeShapeType="1" noTextEdit="1"/>
+          </p:cNvSpPr>
+          <p:nvPr>
+            <p:extLst>
+              <p:ext uri="{386F3935-93C4-4BCD-93E2-E3B085C9AB24}">
+                <p16:designElem xmlns:p16="http://schemas.microsoft.com/office/powerpoint/2015/main" val="1"/>
+              </p:ext>
+            </p:extLst>
+          </p:nvPr>
+        </p:nvSpPr>
+        <p:spPr>
+          <a:xfrm>
+            <a:off x="0" y="0"/>
+            <a:ext cx="964174" cy="6858000"/>
+          </a:xfrm>
+          <a:prstGeom prst="rect">
+            <a:avLst/>
+          </a:prstGeom>
+          <a:solidFill>
+            <a:schemeClr val="bg2"/>
+          </a:solidFill>
+          <a:ln>
+            <a:noFill/>
+          </a:ln>
+        </p:spPr>
+        <p:style>
+          <a:lnRef idx="2">
+            <a:schemeClr val="accent1">
+              <a:shade val="50000"/>
+            </a:schemeClr>
+          </a:lnRef>
+          <a:fillRef idx="1">
+            <a:schemeClr val="accent1"/>
+          </a:fillRef>
+          <a:effectRef idx="0">
+            <a:schemeClr val="accent1"/>
+          </a:effectRef>
+          <a:fontRef idx="minor">
+            <a:schemeClr val="lt1"/>
+          </a:fontRef>
+        </p:style>
+      </p:sp>
+      <p:sp>
+        <p:nvSpPr>
+          <p:cNvPr id="17" name="Rectangle 16">
+            <a:extLst>
+              <a:ext uri="{FF2B5EF4-FFF2-40B4-BE49-F238E27FC236}">
+                <a16:creationId xmlns:a16="http://schemas.microsoft.com/office/drawing/2014/main" id="{9877C2CF-B2DD-41C8-8B5E-152673376B41}"/>
+              </a:ext>
+              <a:ext uri="{C183D7F6-B498-43B3-948B-1728B52AA6E4}">
+                <adec:decorative xmlns:adec="http://schemas.microsoft.com/office/drawing/2017/decorative" val="1"/>
+              </a:ext>
+            </a:extLst>
+          </p:cNvPr>
+          <p:cNvSpPr>
+            <a:spLocks noGrp="1" noRot="1" noChangeAspect="1" noMove="1" noResize="1" noEditPoints="1" noAdjustHandles="1" noChangeArrowheads="1" noChangeShapeType="1" noTextEdit="1"/>
+          </p:cNvSpPr>
+          <p:nvPr>
+            <p:extLst>
+              <p:ext uri="{386F3935-93C4-4BCD-93E2-E3B085C9AB24}">
+                <p16:designElem xmlns:p16="http://schemas.microsoft.com/office/powerpoint/2015/main" val="1"/>
+              </p:ext>
+            </p:extLst>
+          </p:nvPr>
+        </p:nvSpPr>
+        <p:spPr>
+          <a:xfrm>
+            <a:off x="962042" y="0"/>
+            <a:ext cx="45719" cy="6858000"/>
+          </a:xfrm>
+          <a:prstGeom prst="rect">
+            <a:avLst/>
+          </a:prstGeom>
+          <a:solidFill>
+            <a:schemeClr val="accent6"/>
+          </a:solidFill>
+          <a:ln>
+            <a:noFill/>
+          </a:ln>
+        </p:spPr>
+        <p:style>
+          <a:lnRef idx="2">
+            <a:schemeClr val="accent1">
+              <a:shade val="50000"/>
+            </a:schemeClr>
+          </a:lnRef>
+          <a:fillRef idx="1">
+            <a:schemeClr val="accent1"/>
+          </a:fillRef>
+          <a:effectRef idx="0">
+            <a:schemeClr val="accent1"/>
+          </a:effectRef>
+          <a:fontRef idx="minor">
+            <a:schemeClr val="lt1"/>
+          </a:fontRef>
+        </p:style>
+      </p:sp>
+      <p:sp>
+        <p:nvSpPr>
+          <p:cNvPr id="19" name="Rectangle 18">
+            <a:extLst>
+              <a:ext uri="{FF2B5EF4-FFF2-40B4-BE49-F238E27FC236}">
+                <a16:creationId xmlns:a16="http://schemas.microsoft.com/office/drawing/2014/main" id="{D377EE36-E59D-4778-8F99-4B470DA4A306}"/>
+              </a:ext>
+              <a:ext uri="{C183D7F6-B498-43B3-948B-1728B52AA6E4}">
+                <adec:decorative xmlns:adec="http://schemas.microsoft.com/office/drawing/2017/decorative" val="1"/>
+              </a:ext>
+            </a:extLst>
+          </p:cNvPr>
+          <p:cNvSpPr>
+            <a:spLocks noGrp="1" noRot="1" noChangeAspect="1" noMove="1" noResize="1" noEditPoints="1" noAdjustHandles="1" noChangeArrowheads="1" noChangeShapeType="1" noTextEdit="1"/>
+          </p:cNvSpPr>
+          <p:nvPr>
+            <p:extLst>
+              <p:ext uri="{386F3935-93C4-4BCD-93E2-E3B085C9AB24}">
+                <p16:designElem xmlns:p16="http://schemas.microsoft.com/office/powerpoint/2015/main" val="1"/>
+              </p:ext>
+            </p:extLst>
+          </p:nvPr>
+        </p:nvSpPr>
+        <p:spPr>
+          <a:xfrm>
+            <a:off x="1007533" y="0"/>
+            <a:ext cx="7934348" cy="6858000"/>
+          </a:xfrm>
+          <a:prstGeom prst="rect">
+            <a:avLst/>
+          </a:prstGeom>
+          <a:solidFill>
+            <a:schemeClr val="bg2">
+              <a:alpha val="92000"/>
+            </a:schemeClr>
+          </a:solidFill>
+          <a:ln>
+            <a:noFill/>
+          </a:ln>
+        </p:spPr>
+        <p:style>
+          <a:lnRef idx="2">
+            <a:schemeClr val="accent1">
+              <a:shade val="50000"/>
+            </a:schemeClr>
+          </a:lnRef>
+          <a:fillRef idx="1">
+            <a:schemeClr val="accent1"/>
+          </a:fillRef>
+          <a:effectRef idx="0">
+            <a:schemeClr val="accent1"/>
+          </a:effectRef>
+          <a:fontRef idx="minor">
+            <a:schemeClr val="lt1"/>
+          </a:fontRef>
+        </p:style>
+      </p:sp>
+      <p:sp>
+        <p:nvSpPr>
+          <p:cNvPr id="21" name="Rectangle 20">
+            <a:extLst>
+              <a:ext uri="{FF2B5EF4-FFF2-40B4-BE49-F238E27FC236}">
+                <a16:creationId xmlns:a16="http://schemas.microsoft.com/office/drawing/2014/main" id="{2586C6C5-47AF-450A-932D-880EF823E596}"/>
+              </a:ext>
+              <a:ext uri="{C183D7F6-B498-43B3-948B-1728B52AA6E4}">
+                <adec:decorative xmlns:adec="http://schemas.microsoft.com/office/drawing/2017/decorative" val="1"/>
+              </a:ext>
+            </a:extLst>
+          </p:cNvPr>
+          <p:cNvSpPr>
+            <a:spLocks noGrp="1" noRot="1" noChangeAspect="1" noMove="1" noResize="1" noEditPoints="1" noAdjustHandles="1" noChangeArrowheads="1" noChangeShapeType="1" noTextEdit="1"/>
+          </p:cNvSpPr>
+          <p:nvPr>
+            <p:extLst>
+              <p:ext uri="{386F3935-93C4-4BCD-93E2-E3B085C9AB24}">
+                <p16:designElem xmlns:p16="http://schemas.microsoft.com/office/powerpoint/2015/main" val="1"/>
+              </p:ext>
+            </p:extLst>
+          </p:nvPr>
+        </p:nvSpPr>
+        <p:spPr>
+          <a:xfrm>
+            <a:off x="8941881" y="0"/>
+            <a:ext cx="27432" cy="6858000"/>
+          </a:xfrm>
+          <a:prstGeom prst="rect">
+            <a:avLst/>
+          </a:prstGeom>
+          <a:solidFill>
+            <a:schemeClr val="accent6"/>
+          </a:solidFill>
+          <a:ln>
+            <a:noFill/>
+          </a:ln>
+        </p:spPr>
+        <p:style>
+          <a:lnRef idx="2">
+            <a:schemeClr val="accent1">
+              <a:shade val="50000"/>
+            </a:schemeClr>
+          </a:lnRef>
+          <a:fillRef idx="1">
+            <a:schemeClr val="accent1"/>
+          </a:fillRef>
+          <a:effectRef idx="0">
+            <a:schemeClr val="accent1"/>
+          </a:effectRef>
+          <a:fontRef idx="minor">
+            <a:schemeClr val="lt1"/>
+          </a:fontRef>
+        </p:style>
+      </p:sp>
+      <p:sp>
+        <p:nvSpPr>
+          <p:cNvPr id="23" name="TextBox 22">
+            <a:extLst>
+              <a:ext uri="{FF2B5EF4-FFF2-40B4-BE49-F238E27FC236}">
+                <a16:creationId xmlns:a16="http://schemas.microsoft.com/office/drawing/2014/main" id="{A587901A-AA64-4940-9803-F67677851150}"/>
+              </a:ext>
+              <a:ext uri="{C183D7F6-B498-43B3-948B-1728B52AA6E4}">
+                <adec:decorative xmlns:adec="http://schemas.microsoft.com/office/drawing/2017/decorative" val="1"/>
+              </a:ext>
+            </a:extLst>
+          </p:cNvPr>
+          <p:cNvSpPr txBox="1">
+            <a:spLocks noGrp="1" noRot="1" noChangeAspect="1" noMove="1" noResize="1" noEditPoints="1" noAdjustHandles="1" noChangeArrowheads="1" noChangeShapeType="1" noTextEdit="1"/>
+          </p:cNvSpPr>
+          <p:nvPr>
+            <p:extLst>
+              <p:ext uri="{386F3935-93C4-4BCD-93E2-E3B085C9AB24}">
+                <p16:designElem xmlns:p16="http://schemas.microsoft.com/office/powerpoint/2015/main" val="1"/>
+              </p:ext>
+            </p:extLst>
+          </p:nvPr>
+        </p:nvSpPr>
+        <p:spPr>
+          <a:xfrm>
+            <a:off x="2191282" y="3262852"/>
+            <a:ext cx="415636" cy="461665"/>
+          </a:xfrm>
+          <a:prstGeom prst="rect">
+            <a:avLst/>
+          </a:prstGeom>
+          <a:noFill/>
+        </p:spPr>
+        <p:txBody>
+          <a:bodyPr wrap="square" rtlCol="0">
+            <a:spAutoFit/>
+          </a:bodyPr>
+          <a:lstStyle/>
+          <a:p>
+            <a:pPr algn="r">
+              <a:spcAft>
+                <a:spcPts val="600"/>
+              </a:spcAft>
+            </a:pPr>
+            <a:r>
+              <a:rPr lang="en-US" sz="2400" dirty="0">
+                <a:solidFill>
+                  <a:schemeClr val="accent6"/>
+                </a:solidFill>
+                <a:latin typeface="Wingdings 3" panose="05040102010807070707" pitchFamily="18" charset="2"/>
+              </a:rPr>
+              <a:t>z</a:t>
+            </a:r>
+            <a:endParaRPr lang="en-US" sz="2400" dirty="0">
+              <a:solidFill>
+                <a:schemeClr val="accent6"/>
+              </a:solidFill>
+              <a:latin typeface="MS Shell Dlg 2" panose="020B0604030504040204" pitchFamily="34" charset="0"/>
+            </a:endParaRPr>
+          </a:p>
+        </p:txBody>
+      </p:sp>
+      <p:sp useBgFill="1">
+        <p:nvSpPr>
+          <p:cNvPr id="25" name="Rectangle 24">
+            <a:extLst>
+              <a:ext uri="{FF2B5EF4-FFF2-40B4-BE49-F238E27FC236}">
+                <a16:creationId xmlns:a16="http://schemas.microsoft.com/office/drawing/2014/main" id="{4DA9E8CC-6C73-43E6-AF09-B4B1083BCDC7}"/>
+              </a:ext>
+              <a:ext uri="{C183D7F6-B498-43B3-948B-1728B52AA6E4}">
+                <adec:decorative xmlns:adec="http://schemas.microsoft.com/office/drawing/2017/decorative" val="1"/>
+              </a:ext>
+            </a:extLst>
+          </p:cNvPr>
+          <p:cNvSpPr>
+            <a:spLocks noGrp="1" noRot="1" noChangeAspect="1" noMove="1" noResize="1" noEditPoints="1" noAdjustHandles="1" noChangeArrowheads="1" noChangeShapeType="1" noTextEdit="1"/>
+          </p:cNvSpPr>
+          <p:nvPr>
+            <p:extLst>
+              <p:ext uri="{386F3935-93C4-4BCD-93E2-E3B085C9AB24}">
+                <p16:designElem xmlns:p16="http://schemas.microsoft.com/office/powerpoint/2015/main" val="1"/>
+              </p:ext>
+            </p:extLst>
+          </p:nvPr>
+        </p:nvSpPr>
+        <p:spPr>
+          <a:xfrm>
+            <a:off x="0" y="0"/>
+            <a:ext cx="12189867" cy="6855282"/>
+          </a:xfrm>
+          <a:prstGeom prst="rect">
+            <a:avLst/>
+          </a:prstGeom>
+          <a:ln>
+            <a:noFill/>
+          </a:ln>
+        </p:spPr>
+        <p:style>
+          <a:lnRef idx="2">
+            <a:schemeClr val="accent1">
+              <a:shade val="50000"/>
+            </a:schemeClr>
+          </a:lnRef>
+          <a:fillRef idx="1">
+            <a:schemeClr val="accent1"/>
+          </a:fillRef>
+          <a:effectRef idx="0">
+            <a:schemeClr val="accent1"/>
+          </a:effectRef>
+          <a:fontRef idx="minor">
+            <a:schemeClr val="lt1"/>
+          </a:fontRef>
+        </p:style>
+        <p:txBody>
+          <a:bodyPr rtlCol="0" anchor="ctr"/>
+          <a:lstStyle/>
+          <a:p>
+            <a:pPr algn="ctr"/>
+            <a:endParaRPr lang="en-US"/>
+          </a:p>
+        </p:txBody>
+      </p:sp>
+      <p:pic>
+        <p:nvPicPr>
+          <p:cNvPr id="27" name="Picture 26">
+            <a:extLst>
+              <a:ext uri="{FF2B5EF4-FFF2-40B4-BE49-F238E27FC236}">
+                <a16:creationId xmlns:a16="http://schemas.microsoft.com/office/drawing/2014/main" id="{C6DFF5FD-BEF9-4B06-B7C2-58C5CFC92B34}"/>
+              </a:ext>
+              <a:ext uri="{C183D7F6-B498-43B3-948B-1728B52AA6E4}">
+                <adec:decorative xmlns:adec="http://schemas.microsoft.com/office/drawing/2017/decorative" val="1"/>
+              </a:ext>
+            </a:extLst>
+          </p:cNvPr>
+          <p:cNvPicPr>
+            <a:picLocks noGrp="1" noRot="1" noChangeAspect="1" noMove="1" noResize="1" noEditPoints="1" noAdjustHandles="1" noChangeArrowheads="1" noChangeShapeType="1" noCrop="1"/>
+          </p:cNvPicPr>
+          <p:nvPr>
+            <p:extLst>
+              <p:ext uri="{386F3935-93C4-4BCD-93E2-E3B085C9AB24}">
+                <p16:designElem xmlns:p16="http://schemas.microsoft.com/office/powerpoint/2015/main" val="1"/>
+              </p:ext>
+            </p:extLst>
+          </p:nvPr>
+        </p:nvPicPr>
+        <p:blipFill>
+          <a:blip r:embed="rId3">
+            <a:extLst>
+              <a:ext uri="{28A0092B-C50C-407E-A947-70E740481C1C}">
+                <a14:useLocalDpi xmlns:a14="http://schemas.microsoft.com/office/drawing/2010/main" val="0"/>
+              </a:ext>
+            </a:extLst>
+          </a:blip>
+          <a:stretch>
+            <a:fillRect/>
+          </a:stretch>
+        </p:blipFill>
+        <p:spPr>
+          <a:xfrm>
+            <a:off x="2831794" y="2105202"/>
+            <a:ext cx="9360205" cy="4752798"/>
+          </a:xfrm>
+          <a:prstGeom prst="rect">
+            <a:avLst/>
+          </a:prstGeom>
+        </p:spPr>
+      </p:pic>
+      <p:pic>
+        <p:nvPicPr>
+          <p:cNvPr id="29" name="Picture 28">
+            <a:extLst>
+              <a:ext uri="{FF2B5EF4-FFF2-40B4-BE49-F238E27FC236}">
+                <a16:creationId xmlns:a16="http://schemas.microsoft.com/office/drawing/2014/main" id="{C9A18D1D-88E7-41EF-892F-C99BDEEE5E78}"/>
+              </a:ext>
+              <a:ext uri="{C183D7F6-B498-43B3-948B-1728B52AA6E4}">
+                <adec:decorative xmlns:adec="http://schemas.microsoft.com/office/drawing/2017/decorative" val="1"/>
+              </a:ext>
+            </a:extLst>
+          </p:cNvPr>
+          <p:cNvPicPr>
+            <a:picLocks noGrp="1" noRot="1" noChangeAspect="1" noMove="1" noResize="1" noEditPoints="1" noAdjustHandles="1" noChangeArrowheads="1" noChangeShapeType="1" noCrop="1"/>
+          </p:cNvPicPr>
+          <p:nvPr>
+            <p:extLst>
+              <p:ext uri="{386F3935-93C4-4BCD-93E2-E3B085C9AB24}">
+                <p16:designElem xmlns:p16="http://schemas.microsoft.com/office/powerpoint/2015/main" val="1"/>
+              </p:ext>
+            </p:extLst>
+          </p:nvPr>
+        </p:nvPicPr>
+        <p:blipFill>
+          <a:blip r:embed="rId4">
+            <a:alphaModFix/>
+            <a:extLst>
+              <a:ext uri="{28A0092B-C50C-407E-A947-70E740481C1C}">
+                <a14:useLocalDpi xmlns:a14="http://schemas.microsoft.com/office/drawing/2010/main" val="0"/>
+              </a:ext>
+            </a:extLst>
+          </a:blip>
+          <a:stretch>
+            <a:fillRect/>
+          </a:stretch>
+        </p:blipFill>
+        <p:spPr>
+          <a:xfrm>
+            <a:off x="0" y="0"/>
+            <a:ext cx="12189867" cy="6858000"/>
+          </a:xfrm>
+          <a:prstGeom prst="rect">
+            <a:avLst/>
+          </a:prstGeom>
+        </p:spPr>
+      </p:pic>
+      <p:sp>
+        <p:nvSpPr>
+          <p:cNvPr id="31" name="Rectangle 30">
+            <a:extLst>
+              <a:ext uri="{FF2B5EF4-FFF2-40B4-BE49-F238E27FC236}">
+                <a16:creationId xmlns:a16="http://schemas.microsoft.com/office/drawing/2014/main" id="{113E1A2F-E5D7-4888-BA8C-1CDDC7CE2328}"/>
+              </a:ext>
+              <a:ext uri="{C183D7F6-B498-43B3-948B-1728B52AA6E4}">
+                <adec:decorative xmlns:adec="http://schemas.microsoft.com/office/drawing/2017/decorative" val="1"/>
+              </a:ext>
+            </a:extLst>
+          </p:cNvPr>
+          <p:cNvSpPr>
+            <a:spLocks noGrp="1" noRot="1" noChangeAspect="1" noMove="1" noResize="1" noEditPoints="1" noAdjustHandles="1" noChangeArrowheads="1" noChangeShapeType="1" noTextEdit="1"/>
+          </p:cNvSpPr>
+          <p:nvPr>
+            <p:extLst>
+              <p:ext uri="{386F3935-93C4-4BCD-93E2-E3B085C9AB24}">
+                <p16:designElem xmlns:p16="http://schemas.microsoft.com/office/powerpoint/2015/main" val="1"/>
+              </p:ext>
+            </p:extLst>
+          </p:nvPr>
+        </p:nvSpPr>
+        <p:spPr>
+          <a:xfrm>
+            <a:off x="0" y="0"/>
+            <a:ext cx="964174" cy="6858000"/>
+          </a:xfrm>
+          <a:prstGeom prst="rect">
+            <a:avLst/>
+          </a:prstGeom>
+          <a:solidFill>
+            <a:schemeClr val="bg2"/>
+          </a:solidFill>
+          <a:ln>
+            <a:noFill/>
+          </a:ln>
+        </p:spPr>
+        <p:style>
+          <a:lnRef idx="2">
+            <a:schemeClr val="accent1">
+              <a:shade val="50000"/>
+            </a:schemeClr>
+          </a:lnRef>
+          <a:fillRef idx="1">
+            <a:schemeClr val="accent1"/>
+          </a:fillRef>
+          <a:effectRef idx="0">
+            <a:schemeClr val="accent1"/>
+          </a:effectRef>
+          <a:fontRef idx="minor">
+            <a:schemeClr val="lt1"/>
+          </a:fontRef>
+        </p:style>
+        <p:txBody>
+          <a:bodyPr rtlCol="0" anchor="ctr"/>
+          <a:lstStyle/>
+          <a:p>
+            <a:pPr algn="ctr"/>
+            <a:endParaRPr lang="en-US"/>
+          </a:p>
+        </p:txBody>
+      </p:sp>
+      <p:sp>
+        <p:nvSpPr>
+          <p:cNvPr id="33" name="Rectangle 32">
+            <a:extLst>
+              <a:ext uri="{FF2B5EF4-FFF2-40B4-BE49-F238E27FC236}">
+                <a16:creationId xmlns:a16="http://schemas.microsoft.com/office/drawing/2014/main" id="{F625649A-4F9D-4D90-8F0A-433D7A1F685F}"/>
+              </a:ext>
+              <a:ext uri="{C183D7F6-B498-43B3-948B-1728B52AA6E4}">
+                <adec:decorative xmlns:adec="http://schemas.microsoft.com/office/drawing/2017/decorative" val="1"/>
+              </a:ext>
+            </a:extLst>
+          </p:cNvPr>
+          <p:cNvSpPr>
+            <a:spLocks noGrp="1" noRot="1" noChangeAspect="1" noMove="1" noResize="1" noEditPoints="1" noAdjustHandles="1" noChangeArrowheads="1" noChangeShapeType="1" noTextEdit="1"/>
+          </p:cNvSpPr>
+          <p:nvPr>
+            <p:extLst>
+              <p:ext uri="{386F3935-93C4-4BCD-93E2-E3B085C9AB24}">
+                <p16:designElem xmlns:p16="http://schemas.microsoft.com/office/powerpoint/2015/main" val="1"/>
+              </p:ext>
+            </p:extLst>
+          </p:nvPr>
+        </p:nvSpPr>
+        <p:spPr>
+          <a:xfrm>
+            <a:off x="1007533" y="0"/>
+            <a:ext cx="10378001" cy="6858000"/>
+          </a:xfrm>
+          <a:prstGeom prst="rect">
+            <a:avLst/>
+          </a:prstGeom>
+          <a:solidFill>
+            <a:schemeClr val="bg2">
+              <a:alpha val="92000"/>
+            </a:schemeClr>
+          </a:solidFill>
+          <a:ln>
+            <a:noFill/>
+          </a:ln>
+        </p:spPr>
+        <p:style>
+          <a:lnRef idx="2">
+            <a:schemeClr val="accent1">
+              <a:shade val="50000"/>
+            </a:schemeClr>
+          </a:lnRef>
+          <a:fillRef idx="1">
+            <a:schemeClr val="accent1"/>
+          </a:fillRef>
+          <a:effectRef idx="0">
+            <a:schemeClr val="accent1"/>
+          </a:effectRef>
+          <a:fontRef idx="minor">
+            <a:schemeClr val="lt1"/>
+          </a:fontRef>
+        </p:style>
+        <p:txBody>
+          <a:bodyPr rtlCol="0" anchor="ctr"/>
+          <a:lstStyle/>
+          <a:p>
+            <a:pPr algn="ctr"/>
+            <a:endParaRPr lang="en-US"/>
+          </a:p>
+        </p:txBody>
+      </p:sp>
       <p:sp>
         <p:nvSpPr>
           <p:cNvPr id="4" name="Title 3">
@@ -4895,92 +5627,323 @@
         </p:nvSpPr>
         <p:spPr>
           <a:xfrm>
-            <a:off x="1970323" y="1282451"/>
-            <a:ext cx="6771005" cy="1903241"/>
-          </a:xfrm>
-        </p:spPr>
-        <p:txBody>
-          <a:bodyPr/>
-          <a:lstStyle/>
-          <a:p>
-            <a:r>
-              <a:rPr lang="en-US" dirty="0"/>
-              <a:t>Storyboard: </a:t>
+            <a:off x="-1203821" y="125044"/>
+            <a:ext cx="8445357" cy="883524"/>
+          </a:xfrm>
+        </p:spPr>
+        <p:txBody>
+          <a:bodyPr vert="horz" lIns="91440" tIns="45720" rIns="91440" bIns="45720" rtlCol="0" anchor="t">
+            <a:normAutofit/>
+          </a:bodyPr>
+          <a:lstStyle/>
+          <a:p>
+            <a:pPr algn="r"/>
+            <a:r>
+              <a:rPr lang="en-US" sz="2600" dirty="0"/>
+              <a:t>Storyboard: Salary by company and state</a:t>
             </a:r>
             <a:br>
-              <a:rPr lang="en-US" dirty="0"/>
+              <a:rPr lang="en-US" sz="2600" dirty="0"/>
             </a:br>
             <a:r>
-              <a:rPr lang="en-US" dirty="0">
-                <a:highlight>
-                  <a:srgbClr val="0000FF"/>
-                </a:highlight>
-              </a:rPr>
-              <a:t>Internal factors that affect the average salary</a:t>
-            </a:r>
-          </a:p>
-        </p:txBody>
-      </p:sp>
-      <p:sp>
-        <p:nvSpPr>
-          <p:cNvPr id="5" name="Content Placeholder 4">
+              <a:rPr lang="en-US" sz="2600" dirty="0"/>
+              <a:t> </a:t>
+            </a:r>
+            <a:endParaRPr lang="en-US" sz="2600" dirty="0">
+              <a:highlight>
+                <a:srgbClr val="0000FF"/>
+              </a:highlight>
+            </a:endParaRPr>
+          </a:p>
+        </p:txBody>
+      </p:sp>
+      <p:sp>
+        <p:nvSpPr>
+          <p:cNvPr id="35" name="Rectangle 34">
             <a:extLst>
               <a:ext uri="{FF2B5EF4-FFF2-40B4-BE49-F238E27FC236}">
-                <a16:creationId xmlns:a16="http://schemas.microsoft.com/office/drawing/2014/main" id="{2E3FA64B-9622-5A45-B84B-B1EE025856C4}"/>
+                <a16:creationId xmlns:a16="http://schemas.microsoft.com/office/drawing/2014/main" id="{B6F31202-25B1-43E6-94C1-CDCAFFE33CE9}"/>
+              </a:ext>
+              <a:ext uri="{C183D7F6-B498-43B3-948B-1728B52AA6E4}">
+                <adec:decorative xmlns:adec="http://schemas.microsoft.com/office/drawing/2017/decorative" val="1"/>
               </a:ext>
             </a:extLst>
           </p:cNvPr>
           <p:cNvSpPr>
-            <a:spLocks noGrp="1"/>
-          </p:cNvSpPr>
-          <p:nvPr>
-            <p:ph idx="1"/>
-          </p:nvPr>
-        </p:nvSpPr>
-        <p:spPr/>
-        <p:txBody>
-          <a:bodyPr/>
-          <a:lstStyle/>
-          <a:p>
-            <a:r>
-              <a:rPr lang="en-US" dirty="0">
-                <a:highlight>
-                  <a:srgbClr val="0000FF"/>
-                </a:highlight>
-              </a:rPr>
-              <a:t>Image here</a:t>
-            </a:r>
-          </a:p>
-        </p:txBody>
-      </p:sp>
-      <p:sp>
-        <p:nvSpPr>
-          <p:cNvPr id="6" name="Text Placeholder 5">
+            <a:spLocks noGrp="1" noRot="1" noChangeAspect="1" noMove="1" noResize="1" noEditPoints="1" noAdjustHandles="1" noChangeArrowheads="1" noChangeShapeType="1" noTextEdit="1"/>
+          </p:cNvSpPr>
+          <p:nvPr>
+            <p:extLst>
+              <p:ext uri="{386F3935-93C4-4BCD-93E2-E3B085C9AB24}">
+                <p16:designElem xmlns:p16="http://schemas.microsoft.com/office/powerpoint/2015/main" val="1"/>
+              </p:ext>
+            </p:extLst>
+          </p:nvPr>
+        </p:nvSpPr>
+        <p:spPr>
+          <a:xfrm>
+            <a:off x="962042" y="0"/>
+            <a:ext cx="45719" cy="6858000"/>
+          </a:xfrm>
+          <a:prstGeom prst="rect">
+            <a:avLst/>
+          </a:prstGeom>
+          <a:solidFill>
+            <a:schemeClr val="accent6"/>
+          </a:solidFill>
+          <a:ln>
+            <a:noFill/>
+          </a:ln>
+        </p:spPr>
+        <p:style>
+          <a:lnRef idx="2">
+            <a:schemeClr val="accent1">
+              <a:shade val="50000"/>
+            </a:schemeClr>
+          </a:lnRef>
+          <a:fillRef idx="1">
+            <a:schemeClr val="accent1"/>
+          </a:fillRef>
+          <a:effectRef idx="0">
+            <a:schemeClr val="accent1"/>
+          </a:effectRef>
+          <a:fontRef idx="minor">
+            <a:schemeClr val="lt1"/>
+          </a:fontRef>
+        </p:style>
+        <p:txBody>
+          <a:bodyPr rtlCol="0" anchor="ctr"/>
+          <a:lstStyle/>
+          <a:p>
+            <a:pPr algn="ctr"/>
+            <a:endParaRPr lang="en-US"/>
+          </a:p>
+        </p:txBody>
+      </p:sp>
+      <p:pic>
+        <p:nvPicPr>
+          <p:cNvPr id="3" name="Content Placeholder 2" descr="Chart&#10;&#10;Description automatically generated with low confidence">
             <a:extLst>
               <a:ext uri="{FF2B5EF4-FFF2-40B4-BE49-F238E27FC236}">
-                <a16:creationId xmlns:a16="http://schemas.microsoft.com/office/drawing/2014/main" id="{92D7F5F9-1D37-B641-AC5C-AF995E223840}"/>
+                <a16:creationId xmlns:a16="http://schemas.microsoft.com/office/drawing/2014/main" id="{57D5E9F9-AE07-D44E-8B50-CF26771436C2}"/>
               </a:ext>
             </a:extLst>
           </p:cNvPr>
-          <p:cNvSpPr>
-            <a:spLocks noGrp="1"/>
-          </p:cNvSpPr>
-          <p:nvPr>
-            <p:ph type="body" sz="half" idx="2"/>
-          </p:nvPr>
-        </p:nvSpPr>
-        <p:spPr/>
-        <p:txBody>
-          <a:bodyPr/>
-          <a:lstStyle/>
-          <a:p>
-            <a:r>
-              <a:rPr lang="en-US" dirty="0">
-                <a:highlight>
-                  <a:srgbClr val="0000FF"/>
-                </a:highlight>
-              </a:rPr>
-              <a:t>Description of visual and any interactive features</a:t>
+          <p:cNvPicPr>
+            <a:picLocks noGrp="1" noChangeAspect="1"/>
+          </p:cNvPicPr>
+          <p:nvPr>
+            <p:ph idx="1"/>
+          </p:nvPr>
+        </p:nvPicPr>
+        <p:blipFill rotWithShape="1">
+          <a:blip r:embed="rId5"/>
+          <a:srcRect r="-1" b="4709"/>
+          <a:stretch/>
+        </p:blipFill>
+        <p:spPr>
+          <a:xfrm>
+            <a:off x="1007533" y="568165"/>
+            <a:ext cx="10380133" cy="4030679"/>
+          </a:xfrm>
+          <a:prstGeom prst="rect">
+            <a:avLst/>
+          </a:prstGeom>
+          <a:ln>
+            <a:solidFill>
+              <a:schemeClr val="accent6"/>
+            </a:solidFill>
+          </a:ln>
+        </p:spPr>
+      </p:pic>
+      <p:sp>
+        <p:nvSpPr>
+          <p:cNvPr id="37" name="Rectangle 36">
+            <a:extLst>
+              <a:ext uri="{FF2B5EF4-FFF2-40B4-BE49-F238E27FC236}">
+                <a16:creationId xmlns:a16="http://schemas.microsoft.com/office/drawing/2014/main" id="{588507C5-B772-411D-B50E-0C075AD253C4}"/>
+              </a:ext>
+              <a:ext uri="{C183D7F6-B498-43B3-948B-1728B52AA6E4}">
+                <adec:decorative xmlns:adec="http://schemas.microsoft.com/office/drawing/2017/decorative" val="1"/>
+              </a:ext>
+            </a:extLst>
+          </p:cNvPr>
+          <p:cNvSpPr>
+            <a:spLocks noGrp="1" noRot="1" noChangeAspect="1" noMove="1" noResize="1" noEditPoints="1" noAdjustHandles="1" noChangeArrowheads="1" noChangeShapeType="1" noTextEdit="1"/>
+          </p:cNvSpPr>
+          <p:nvPr>
+            <p:extLst>
+              <p:ext uri="{386F3935-93C4-4BCD-93E2-E3B085C9AB24}">
+                <p16:designElem xmlns:p16="http://schemas.microsoft.com/office/powerpoint/2015/main" val="1"/>
+              </p:ext>
+            </p:extLst>
+          </p:nvPr>
+        </p:nvSpPr>
+        <p:spPr>
+          <a:xfrm>
+            <a:off x="11387666" y="-2718"/>
+            <a:ext cx="27432" cy="6858000"/>
+          </a:xfrm>
+          <a:prstGeom prst="rect">
+            <a:avLst/>
+          </a:prstGeom>
+          <a:solidFill>
+            <a:schemeClr val="accent6"/>
+          </a:solidFill>
+          <a:ln>
+            <a:noFill/>
+          </a:ln>
+        </p:spPr>
+        <p:style>
+          <a:lnRef idx="2">
+            <a:schemeClr val="accent1">
+              <a:shade val="50000"/>
+            </a:schemeClr>
+          </a:lnRef>
+          <a:fillRef idx="1">
+            <a:schemeClr val="accent1"/>
+          </a:fillRef>
+          <a:effectRef idx="0">
+            <a:schemeClr val="accent1"/>
+          </a:effectRef>
+          <a:fontRef idx="minor">
+            <a:schemeClr val="lt1"/>
+          </a:fontRef>
+        </p:style>
+        <p:txBody>
+          <a:bodyPr rtlCol="0" anchor="ctr"/>
+          <a:lstStyle/>
+          <a:p>
+            <a:pPr algn="ctr"/>
+            <a:endParaRPr lang="en-US"/>
+          </a:p>
+        </p:txBody>
+      </p:sp>
+      <p:sp>
+        <p:nvSpPr>
+          <p:cNvPr id="7" name="TextBox 6">
+            <a:extLst>
+              <a:ext uri="{FF2B5EF4-FFF2-40B4-BE49-F238E27FC236}">
+                <a16:creationId xmlns:a16="http://schemas.microsoft.com/office/drawing/2014/main" id="{E0FC4D70-78FF-B44A-B24C-7D23E5585F1F}"/>
+              </a:ext>
+            </a:extLst>
+          </p:cNvPr>
+          <p:cNvSpPr txBox="1"/>
+          <p:nvPr/>
+        </p:nvSpPr>
+        <p:spPr>
+          <a:xfrm>
+            <a:off x="1077592" y="4849900"/>
+            <a:ext cx="4751908" cy="1754326"/>
+          </a:xfrm>
+          <a:prstGeom prst="rect">
+            <a:avLst/>
+          </a:prstGeom>
+          <a:noFill/>
+        </p:spPr>
+        <p:txBody>
+          <a:bodyPr wrap="square" rtlCol="0">
+            <a:spAutoFit/>
+          </a:bodyPr>
+          <a:lstStyle/>
+          <a:p>
+            <a:r>
+              <a:rPr lang="en-US" dirty="0"/>
+              <a:t>This Interactive Tableau Dashboard visual will show the average salary by company.  It is interactive for the user because they can highlight the company they want to see either type in the company name or select from a dropdown</a:t>
+            </a:r>
+          </a:p>
+        </p:txBody>
+      </p:sp>
+      <p:sp>
+        <p:nvSpPr>
+          <p:cNvPr id="22" name="TextBox 21">
+            <a:extLst>
+              <a:ext uri="{FF2B5EF4-FFF2-40B4-BE49-F238E27FC236}">
+                <a16:creationId xmlns:a16="http://schemas.microsoft.com/office/drawing/2014/main" id="{80154CB1-5F1E-3E48-A98D-FD67E440A2EC}"/>
+              </a:ext>
+            </a:extLst>
+          </p:cNvPr>
+          <p:cNvSpPr txBox="1"/>
+          <p:nvPr/>
+        </p:nvSpPr>
+        <p:spPr>
+          <a:xfrm>
+            <a:off x="6094933" y="4935552"/>
+            <a:ext cx="4751908" cy="1200329"/>
+          </a:xfrm>
+          <a:prstGeom prst="rect">
+            <a:avLst/>
+          </a:prstGeom>
+          <a:noFill/>
+        </p:spPr>
+        <p:txBody>
+          <a:bodyPr wrap="square" rtlCol="0">
+            <a:spAutoFit/>
+          </a:bodyPr>
+          <a:lstStyle/>
+          <a:p>
+            <a:r>
+              <a:rPr lang="en-US" dirty="0"/>
+              <a:t>This Interactive Tableau Dashboard will show the average salary by state.  It is interactive for the user because they can filter by both state and desired average Salary.</a:t>
+            </a:r>
+          </a:p>
+        </p:txBody>
+      </p:sp>
+      <p:sp>
+        <p:nvSpPr>
+          <p:cNvPr id="24" name="TextBox 23">
+            <a:extLst>
+              <a:ext uri="{FF2B5EF4-FFF2-40B4-BE49-F238E27FC236}">
+                <a16:creationId xmlns:a16="http://schemas.microsoft.com/office/drawing/2014/main" id="{8512B03D-ADC4-A84E-991C-FA1D7BC78172}"/>
+              </a:ext>
+            </a:extLst>
+          </p:cNvPr>
+          <p:cNvSpPr txBox="1"/>
+          <p:nvPr/>
+        </p:nvSpPr>
+        <p:spPr>
+          <a:xfrm>
+            <a:off x="1534076" y="4569281"/>
+            <a:ext cx="9646591" cy="246221"/>
+          </a:xfrm>
+          <a:prstGeom prst="rect">
+            <a:avLst/>
+          </a:prstGeom>
+          <a:noFill/>
+        </p:spPr>
+        <p:txBody>
+          <a:bodyPr wrap="square">
+            <a:spAutoFit/>
+          </a:bodyPr>
+          <a:lstStyle/>
+          <a:p>
+            <a:r>
+              <a:rPr lang="en-US" sz="1000" dirty="0"/>
+              <a:t>https://</a:t>
+            </a:r>
+            <a:r>
+              <a:rPr lang="en-US" sz="1000" dirty="0" err="1"/>
+              <a:t>public.tableau.com</a:t>
+            </a:r>
+            <a:r>
+              <a:rPr lang="en-US" sz="1000" dirty="0"/>
+              <a:t>/app/profile/</a:t>
+            </a:r>
+            <a:r>
+              <a:rPr lang="en-US" sz="1000" dirty="0" err="1"/>
+              <a:t>mackenzie.coushay.richter</a:t>
+            </a:r>
+            <a:r>
+              <a:rPr lang="en-US" sz="1000" dirty="0"/>
+              <a:t>/viz/SalaryAnalysis-Summary_16482343926450/</a:t>
+            </a:r>
+            <a:r>
+              <a:rPr lang="en-US" sz="1000" dirty="0" err="1"/>
+              <a:t>AverageSalarybyLocationCompany?publish</a:t>
+            </a:r>
+            <a:r>
+              <a:rPr lang="en-US" sz="1000" dirty="0"/>
+              <a:t>=yes</a:t>
             </a:r>
           </a:p>
         </p:txBody>
@@ -4995,6 +5958,411 @@
   <p:clrMapOvr>
     <a:masterClrMapping/>
   </p:clrMapOvr>
+  <p:timing>
+    <p:tnLst>
+      <p:par>
+        <p:cTn id="1" dur="indefinite" restart="never" nodeType="tmRoot">
+          <p:childTnLst>
+            <p:seq concurrent="1" nextAc="seek">
+              <p:cTn id="2" dur="indefinite" nodeType="mainSeq">
+                <p:childTnLst>
+                  <p:par>
+                    <p:cTn id="3" fill="hold">
+                      <p:stCondLst>
+                        <p:cond delay="indefinite"/>
+                        <p:cond evt="onBegin" delay="0">
+                          <p:tn val="2"/>
+                        </p:cond>
+                      </p:stCondLst>
+                      <p:childTnLst>
+                        <p:par>
+                          <p:cTn id="4" fill="hold">
+                            <p:stCondLst>
+                              <p:cond delay="0"/>
+                            </p:stCondLst>
+                            <p:childTnLst>
+                              <p:par>
+                                <p:cTn id="5" presetID="10" presetClass="entr" presetSubtype="0" fill="hold" grpId="0" nodeType="withEffect">
+                                  <p:stCondLst>
+                                    <p:cond delay="1000"/>
+                                  </p:stCondLst>
+                                  <p:iterate>
+                                    <p:tmPct val="10000"/>
+                                  </p:iterate>
+                                  <p:childTnLst>
+                                    <p:set>
+                                      <p:cBhvr>
+                                        <p:cTn id="6" dur="1" fill="hold">
+                                          <p:stCondLst>
+                                            <p:cond delay="0"/>
+                                          </p:stCondLst>
+                                        </p:cTn>
+                                        <p:tgtEl>
+                                          <p:spTgt spid="4"/>
+                                        </p:tgtEl>
+                                        <p:attrNameLst>
+                                          <p:attrName>style.visibility</p:attrName>
+                                        </p:attrNameLst>
+                                      </p:cBhvr>
+                                      <p:to>
+                                        <p:strVal val="visible"/>
+                                      </p:to>
+                                    </p:set>
+                                    <p:animEffect transition="in" filter="fade">
+                                      <p:cBhvr>
+                                        <p:cTn id="7" dur="700"/>
+                                        <p:tgtEl>
+                                          <p:spTgt spid="4"/>
+                                        </p:tgtEl>
+                                      </p:cBhvr>
+                                    </p:animEffect>
+                                  </p:childTnLst>
+                                </p:cTn>
+                              </p:par>
+                            </p:childTnLst>
+                          </p:cTn>
+                        </p:par>
+                      </p:childTnLst>
+                    </p:cTn>
+                  </p:par>
+                </p:childTnLst>
+              </p:cTn>
+              <p:prevCondLst>
+                <p:cond evt="onPrev" delay="0">
+                  <p:tgtEl>
+                    <p:sldTgt/>
+                  </p:tgtEl>
+                </p:cond>
+              </p:prevCondLst>
+              <p:nextCondLst>
+                <p:cond evt="onNext" delay="0">
+                  <p:tgtEl>
+                    <p:sldTgt/>
+                  </p:tgtEl>
+                </p:cond>
+              </p:nextCondLst>
+            </p:seq>
+          </p:childTnLst>
+        </p:cTn>
+      </p:par>
+    </p:tnLst>
+    <p:bldLst>
+      <p:bldP spid="4" grpId="0"/>
+    </p:bldLst>
+  </p:timing>
+</p:sld>
+</file>
+
+<file path=ppt/slides/slide13.xml><?xml version="1.0" encoding="utf-8"?>
+<p:sld xmlns:a="http://schemas.openxmlformats.org/drawingml/2006/main" xmlns:r="http://schemas.openxmlformats.org/officeDocument/2006/relationships" xmlns:p="http://schemas.openxmlformats.org/presentationml/2006/main">
+  <p:cSld>
+    <p:spTree>
+      <p:nvGrpSpPr>
+        <p:cNvPr id="1" name=""/>
+        <p:cNvGrpSpPr/>
+        <p:nvPr/>
+      </p:nvGrpSpPr>
+      <p:grpSpPr>
+        <a:xfrm>
+          <a:off x="0" y="0"/>
+          <a:ext cx="0" cy="0"/>
+          <a:chOff x="0" y="0"/>
+          <a:chExt cx="0" cy="0"/>
+        </a:xfrm>
+      </p:grpSpPr>
+      <p:sp>
+        <p:nvSpPr>
+          <p:cNvPr id="2" name="Title 1">
+            <a:extLst>
+              <a:ext uri="{FF2B5EF4-FFF2-40B4-BE49-F238E27FC236}">
+                <a16:creationId xmlns:a16="http://schemas.microsoft.com/office/drawing/2014/main" id="{B8CF43CD-32FA-7B43-BCD4-FF059560C06F}"/>
+              </a:ext>
+            </a:extLst>
+          </p:cNvPr>
+          <p:cNvSpPr>
+            <a:spLocks noGrp="1"/>
+          </p:cNvSpPr>
+          <p:nvPr>
+            <p:ph type="title"/>
+          </p:nvPr>
+        </p:nvSpPr>
+        <p:spPr>
+          <a:xfrm>
+            <a:off x="1412762" y="4620930"/>
+            <a:ext cx="6602461" cy="1903241"/>
+          </a:xfrm>
+        </p:spPr>
+        <p:txBody>
+          <a:bodyPr>
+            <a:normAutofit/>
+          </a:bodyPr>
+          <a:lstStyle/>
+          <a:p>
+            <a:r>
+              <a:rPr lang="en-US" dirty="0"/>
+              <a:t>This visual created with Tableau shows average salary by Years of experience collected from our dataset</a:t>
+            </a:r>
+          </a:p>
+        </p:txBody>
+      </p:sp>
+      <p:pic>
+        <p:nvPicPr>
+          <p:cNvPr id="6" name="Content Placeholder 5" descr="Chart, line chart&#10;&#10;Description automatically generated">
+            <a:extLst>
+              <a:ext uri="{FF2B5EF4-FFF2-40B4-BE49-F238E27FC236}">
+                <a16:creationId xmlns:a16="http://schemas.microsoft.com/office/drawing/2014/main" id="{9521D512-CF91-0D4F-B7F6-C38C73801111}"/>
+              </a:ext>
+            </a:extLst>
+          </p:cNvPr>
+          <p:cNvPicPr>
+            <a:picLocks noGrp="1" noChangeAspect="1"/>
+          </p:cNvPicPr>
+          <p:nvPr>
+            <p:ph idx="1"/>
+          </p:nvPr>
+        </p:nvPicPr>
+        <p:blipFill>
+          <a:blip r:embed="rId2"/>
+          <a:stretch>
+            <a:fillRect/>
+          </a:stretch>
+        </p:blipFill>
+        <p:spPr>
+          <a:xfrm>
+            <a:off x="1180060" y="680284"/>
+            <a:ext cx="6602461" cy="3835959"/>
+          </a:xfrm>
+        </p:spPr>
+      </p:pic>
+      <p:sp>
+        <p:nvSpPr>
+          <p:cNvPr id="7" name="Title 3">
+            <a:extLst>
+              <a:ext uri="{FF2B5EF4-FFF2-40B4-BE49-F238E27FC236}">
+                <a16:creationId xmlns:a16="http://schemas.microsoft.com/office/drawing/2014/main" id="{7D9205E5-567E-5B47-A4B5-95CDB768136C}"/>
+              </a:ext>
+            </a:extLst>
+          </p:cNvPr>
+          <p:cNvSpPr txBox="1">
+            <a:spLocks/>
+          </p:cNvSpPr>
+          <p:nvPr/>
+        </p:nvSpPr>
+        <p:spPr>
+          <a:xfrm>
+            <a:off x="357348" y="186179"/>
+            <a:ext cx="8445357" cy="883524"/>
+          </a:xfrm>
+          <a:prstGeom prst="rect">
+            <a:avLst/>
+          </a:prstGeom>
+        </p:spPr>
+        <p:txBody>
+          <a:bodyPr vert="horz" lIns="91440" tIns="45720" rIns="91440" bIns="45720" rtlCol="0" anchor="t">
+            <a:normAutofit/>
+          </a:bodyPr>
+          <a:lstStyle>
+            <a:lvl1pPr algn="l" defTabSz="914400" rtl="0" eaLnBrk="1" latinLnBrk="0" hangingPunct="1">
+              <a:lnSpc>
+                <a:spcPct val="90000"/>
+              </a:lnSpc>
+              <a:spcBef>
+                <a:spcPct val="0"/>
+              </a:spcBef>
+              <a:buNone/>
+              <a:defRPr sz="2400" b="0" i="0" kern="1200" cap="none">
+                <a:solidFill>
+                  <a:schemeClr val="tx1"/>
+                </a:solidFill>
+                <a:effectLst/>
+                <a:latin typeface="+mj-lt"/>
+                <a:ea typeface="+mj-ea"/>
+                <a:cs typeface="+mj-cs"/>
+              </a:defRPr>
+            </a:lvl1pPr>
+          </a:lstStyle>
+          <a:p>
+            <a:pPr algn="r"/>
+            <a:r>
+              <a:rPr lang="en-US" sz="2600" dirty="0"/>
+              <a:t>Storyboard: Average Salary By  Years of Experience</a:t>
+            </a:r>
+            <a:br>
+              <a:rPr lang="en-US" sz="2600" dirty="0"/>
+            </a:br>
+            <a:r>
+              <a:rPr lang="en-US" sz="2600" dirty="0"/>
+              <a:t> </a:t>
+            </a:r>
+            <a:endParaRPr lang="en-US" sz="2600" dirty="0">
+              <a:highlight>
+                <a:srgbClr val="0000FF"/>
+              </a:highlight>
+            </a:endParaRPr>
+          </a:p>
+        </p:txBody>
+      </p:sp>
+      <p:sp>
+        <p:nvSpPr>
+          <p:cNvPr id="9" name="TextBox 8">
+            <a:extLst>
+              <a:ext uri="{FF2B5EF4-FFF2-40B4-BE49-F238E27FC236}">
+                <a16:creationId xmlns:a16="http://schemas.microsoft.com/office/drawing/2014/main" id="{B482E384-CC93-814D-9B0A-004EC7B32748}"/>
+              </a:ext>
+            </a:extLst>
+          </p:cNvPr>
+          <p:cNvSpPr txBox="1"/>
+          <p:nvPr/>
+        </p:nvSpPr>
+        <p:spPr>
+          <a:xfrm>
+            <a:off x="1180059" y="4516243"/>
+            <a:ext cx="9257482" cy="246221"/>
+          </a:xfrm>
+          <a:prstGeom prst="rect">
+            <a:avLst/>
+          </a:prstGeom>
+          <a:noFill/>
+        </p:spPr>
+        <p:txBody>
+          <a:bodyPr wrap="square">
+            <a:spAutoFit/>
+          </a:bodyPr>
+          <a:lstStyle/>
+          <a:p>
+            <a:r>
+              <a:rPr lang="en-US" sz="1000" dirty="0"/>
+              <a:t>https://</a:t>
+            </a:r>
+            <a:r>
+              <a:rPr lang="en-US" sz="1000" dirty="0" err="1"/>
+              <a:t>public.tableau.com</a:t>
+            </a:r>
+            <a:r>
+              <a:rPr lang="en-US" sz="1000" dirty="0"/>
+              <a:t>/app/profile/</a:t>
+            </a:r>
+            <a:r>
+              <a:rPr lang="en-US" sz="1000" dirty="0" err="1"/>
+              <a:t>mackenzie.coushay.richter</a:t>
+            </a:r>
+            <a:r>
+              <a:rPr lang="en-US" sz="1000" dirty="0"/>
+              <a:t>/viz/SalaryAnalysis-Summary_16482343926450/</a:t>
+            </a:r>
+            <a:r>
+              <a:rPr lang="en-US" sz="1000" dirty="0" err="1"/>
+              <a:t>Salarybyexp_years?publish</a:t>
+            </a:r>
+            <a:r>
+              <a:rPr lang="en-US" sz="1000" dirty="0"/>
+              <a:t>=yes</a:t>
+            </a:r>
+          </a:p>
+        </p:txBody>
+      </p:sp>
+    </p:spTree>
+    <p:extLst>
+      <p:ext uri="{BB962C8B-B14F-4D97-AF65-F5344CB8AC3E}">
+        <p14:creationId xmlns:p14="http://schemas.microsoft.com/office/powerpoint/2010/main" val="2725483518"/>
+      </p:ext>
+    </p:extLst>
+  </p:cSld>
+  <p:clrMapOvr>
+    <a:masterClrMapping/>
+  </p:clrMapOvr>
+  <p:timing>
+    <p:tnLst>
+      <p:par>
+        <p:cTn id="1" dur="indefinite" restart="never" nodeType="tmRoot">
+          <p:childTnLst>
+            <p:seq concurrent="1" nextAc="seek">
+              <p:cTn id="2" dur="indefinite" nodeType="mainSeq">
+                <p:childTnLst>
+                  <p:par>
+                    <p:cTn id="3" fill="hold">
+                      <p:stCondLst>
+                        <p:cond delay="indefinite"/>
+                        <p:cond evt="onBegin" delay="0">
+                          <p:tn val="2"/>
+                        </p:cond>
+                      </p:stCondLst>
+                      <p:childTnLst>
+                        <p:par>
+                          <p:cTn id="4" fill="hold">
+                            <p:stCondLst>
+                              <p:cond delay="0"/>
+                            </p:stCondLst>
+                            <p:childTnLst>
+                              <p:par>
+                                <p:cTn id="5" presetID="10" presetClass="entr" presetSubtype="0" fill="hold" grpId="0" nodeType="withEffect">
+                                  <p:stCondLst>
+                                    <p:cond delay="1000"/>
+                                  </p:stCondLst>
+                                  <p:iterate>
+                                    <p:tmPct val="10000"/>
+                                  </p:iterate>
+                                  <p:childTnLst>
+                                    <p:set>
+                                      <p:cBhvr>
+                                        <p:cTn id="6" dur="1" fill="hold">
+                                          <p:stCondLst>
+                                            <p:cond delay="0"/>
+                                          </p:stCondLst>
+                                        </p:cTn>
+                                        <p:tgtEl>
+                                          <p:spTgt spid="7"/>
+                                        </p:tgtEl>
+                                        <p:attrNameLst>
+                                          <p:attrName>style.visibility</p:attrName>
+                                        </p:attrNameLst>
+                                      </p:cBhvr>
+                                      <p:to>
+                                        <p:strVal val="visible"/>
+                                      </p:to>
+                                    </p:set>
+                                    <p:animEffect transition="in" filter="fade">
+                                      <p:cBhvr>
+                                        <p:cTn id="7" dur="700"/>
+                                        <p:tgtEl>
+                                          <p:spTgt spid="7"/>
+                                        </p:tgtEl>
+                                      </p:cBhvr>
+                                    </p:animEffect>
+                                  </p:childTnLst>
+                                </p:cTn>
+                              </p:par>
+                            </p:childTnLst>
+                          </p:cTn>
+                        </p:par>
+                      </p:childTnLst>
+                    </p:cTn>
+                  </p:par>
+                </p:childTnLst>
+              </p:cTn>
+              <p:prevCondLst>
+                <p:cond evt="onPrev" delay="0">
+                  <p:tgtEl>
+                    <p:sldTgt/>
+                  </p:tgtEl>
+                </p:cond>
+              </p:prevCondLst>
+              <p:nextCondLst>
+                <p:cond evt="onNext" delay="0">
+                  <p:tgtEl>
+                    <p:sldTgt/>
+                  </p:tgtEl>
+                </p:cond>
+              </p:nextCondLst>
+            </p:seq>
+          </p:childTnLst>
+        </p:cTn>
+      </p:par>
+    </p:tnLst>
+    <p:bldLst>
+      <p:bldP spid="7" grpId="0"/>
+    </p:bldLst>
+  </p:timing>
 </p:sld>
 </file>
 

</xml_diff>

<commit_message>
update database to align with ERD
</commit_message>
<xml_diff>
--- a/2nd Segment Project Deliverable/Deliverable2_Storyboard.pptx
+++ b/2nd Segment Project Deliverable/Deliverable2_Storyboard.pptx
@@ -341,7 +341,7 @@
           <a:p>
             <a:fld id="{9AB3A824-1A51-4B26-AD58-A6D8E14F6C04}" type="datetimeFigureOut">
               <a:rPr lang="en-US" dirty="0"/>
-              <a:t>3/25/22</a:t>
+              <a:t>3/26/2022</a:t>
             </a:fld>
             <a:endParaRPr lang="en-US" dirty="0"/>
           </a:p>
@@ -675,7 +675,7 @@
           <a:p>
             <a:fld id="{D857E33E-8B18-4087-B112-809917729534}" type="datetimeFigureOut">
               <a:rPr lang="en-US" dirty="0"/>
-              <a:t>3/25/22</a:t>
+              <a:t>3/26/2022</a:t>
             </a:fld>
             <a:endParaRPr lang="en-US" dirty="0"/>
           </a:p>
@@ -977,7 +977,7 @@
           <a:p>
             <a:fld id="{D3FFE419-2371-464F-8239-3959401C3561}" type="datetimeFigureOut">
               <a:rPr lang="en-US" dirty="0"/>
-              <a:t>3/25/22</a:t>
+              <a:t>3/26/2022</a:t>
             </a:fld>
             <a:endParaRPr lang="en-US" dirty="0"/>
           </a:p>
@@ -1224,7 +1224,7 @@
           <a:p>
             <a:fld id="{97D162C4-EDD9-4389-A98B-B87ECEA2A816}" type="datetimeFigureOut">
               <a:rPr lang="en-US" dirty="0"/>
-              <a:t>3/25/22</a:t>
+              <a:t>3/26/2022</a:t>
             </a:fld>
             <a:endParaRPr lang="en-US" dirty="0"/>
           </a:p>
@@ -1631,7 +1631,7 @@
           <a:p>
             <a:fld id="{3E5059C3-6A89-4494-99FF-5A4D6FFD50EB}" type="datetimeFigureOut">
               <a:rPr lang="en-US" dirty="0"/>
-              <a:t>3/25/22</a:t>
+              <a:t>3/26/2022</a:t>
             </a:fld>
             <a:endParaRPr lang="en-US" dirty="0"/>
           </a:p>
@@ -1945,7 +1945,7 @@
           <a:p>
             <a:fld id="{CA954B2F-12DE-47F5-8894-472B206D2E1E}" type="datetimeFigureOut">
               <a:rPr lang="en-US" dirty="0"/>
-              <a:t>3/25/22</a:t>
+              <a:t>3/26/2022</a:t>
             </a:fld>
             <a:endParaRPr lang="en-US" dirty="0"/>
           </a:p>
@@ -2489,7 +2489,7 @@
           <a:p>
             <a:fld id="{3F30E46F-7819-4ACF-B48B-48222C2ACC88}" type="datetimeFigureOut">
               <a:rPr lang="en-US" dirty="0"/>
-              <a:t>3/25/22</a:t>
+              <a:t>3/26/2022</a:t>
             </a:fld>
             <a:endParaRPr lang="en-US" dirty="0"/>
           </a:p>
@@ -2684,7 +2684,7 @@
           <a:p>
             <a:fld id="{1FAF3416-4057-4DAA-829D-4CA07428D088}" type="datetimeFigureOut">
               <a:rPr lang="en-US" dirty="0"/>
-              <a:t>3/25/22</a:t>
+              <a:t>3/26/2022</a:t>
             </a:fld>
             <a:endParaRPr lang="en-US" dirty="0"/>
           </a:p>
@@ -2897,7 +2897,7 @@
           <a:p>
             <a:fld id="{921D9284-D300-4297-87F7-E791DCC15DB1}" type="datetimeFigureOut">
               <a:rPr lang="en-US" dirty="0"/>
-              <a:t>3/25/22</a:t>
+              <a:t>3/26/2022</a:t>
             </a:fld>
             <a:endParaRPr lang="en-US" dirty="0"/>
           </a:p>
@@ -3266,7 +3266,7 @@
           <a:p>
             <a:fld id="{37D525BB-DA17-4BA0-B3C8-3AC3ABC827E6}" type="datetimeFigureOut">
               <a:rPr lang="en-US" dirty="0"/>
-              <a:t>3/25/22</a:t>
+              <a:t>3/26/2022</a:t>
             </a:fld>
             <a:endParaRPr lang="en-US" dirty="0"/>
           </a:p>
@@ -3669,7 +3669,7 @@
           <a:p>
             <a:fld id="{B16C4C9A-3960-41CF-A4E9-2A8FB932454B}" type="datetimeFigureOut">
               <a:rPr lang="en-US" dirty="0"/>
-              <a:t>3/25/22</a:t>
+              <a:t>3/26/2022</a:t>
             </a:fld>
             <a:endParaRPr lang="en-US" dirty="0"/>
           </a:p>
@@ -3980,7 +3980,7 @@
           <a:p>
             <a:fld id="{3CBC1C18-307B-4F68-A007-B5B542270E8D}" type="datetimeFigureOut">
               <a:rPr lang="en-US" dirty="0"/>
-              <a:t>3/25/22</a:t>
+              <a:t>3/26/2022</a:t>
             </a:fld>
             <a:endParaRPr lang="en-US" dirty="0"/>
           </a:p>
@@ -6710,7 +6710,7 @@
         <p:spPr/>
         <p:txBody>
           <a:bodyPr>
-            <a:normAutofit lnSpcReduction="10000"/>
+            <a:normAutofit fontScale="92500" lnSpcReduction="20000"/>
           </a:bodyPr>
           <a:lstStyle/>
           <a:p>
@@ -6731,7 +6731,14 @@
             <a:pPr lvl="1"/>
             <a:r>
               <a:rPr lang="en-US" sz="1400" dirty="0"/>
-              <a:t>Dropping unnecessary columns in Data Frame, such as</a:t>
+              <a:t>Dropping columns in Data Frame, such as race, bonus, stock, other details, tag</a:t>
+            </a:r>
+          </a:p>
+          <a:p>
+            <a:pPr lvl="1"/>
+            <a:r>
+              <a:rPr lang="en-US" sz="1400" dirty="0"/>
+              <a:t>Remove outlier</a:t>
             </a:r>
           </a:p>
           <a:p>
@@ -7380,7 +7387,7 @@
             <a:pPr algn="ctr"/>
             <a:r>
               <a:rPr lang="en-US" dirty="0"/>
-              <a:t>Cross Validation– Using Neural Network</a:t>
+              <a:t>Analysis of Data– Using Neural Network</a:t>
             </a:r>
             <a:br>
               <a:rPr lang="en-US" dirty="0"/>

</xml_diff>